<commit_message>
Added context and use case diagrams
</commit_message>
<xml_diff>
--- a/designdocs/Project Plan Presentation.pptx
+++ b/designdocs/Project Plan Presentation.pptx
@@ -5,7 +5,7 @@
     <p:sldMasterId id="2147483656" r:id="rId1"/>
   </p:sldMasterIdLst>
   <p:notesMasterIdLst>
-    <p:notesMasterId r:id="rId24"/>
+    <p:notesMasterId r:id="rId25"/>
   </p:notesMasterIdLst>
   <p:sldIdLst>
     <p:sldId id="257" r:id="rId2"/>
@@ -20,32 +20,33 @@
     <p:sldId id="281" r:id="rId11"/>
     <p:sldId id="267" r:id="rId12"/>
     <p:sldId id="268" r:id="rId13"/>
-    <p:sldId id="271" r:id="rId14"/>
-    <p:sldId id="272" r:id="rId15"/>
-    <p:sldId id="282" r:id="rId16"/>
-    <p:sldId id="283" r:id="rId17"/>
-    <p:sldId id="284" r:id="rId18"/>
-    <p:sldId id="273" r:id="rId19"/>
-    <p:sldId id="274" r:id="rId20"/>
-    <p:sldId id="275" r:id="rId21"/>
-    <p:sldId id="285" r:id="rId22"/>
-    <p:sldId id="286" r:id="rId23"/>
+    <p:sldId id="287" r:id="rId14"/>
+    <p:sldId id="271" r:id="rId15"/>
+    <p:sldId id="272" r:id="rId16"/>
+    <p:sldId id="282" r:id="rId17"/>
+    <p:sldId id="283" r:id="rId18"/>
+    <p:sldId id="284" r:id="rId19"/>
+    <p:sldId id="273" r:id="rId20"/>
+    <p:sldId id="274" r:id="rId21"/>
+    <p:sldId id="275" r:id="rId22"/>
+    <p:sldId id="285" r:id="rId23"/>
+    <p:sldId id="286" r:id="rId24"/>
   </p:sldIdLst>
   <p:sldSz cx="12192000" cy="6858000"/>
   <p:notesSz cx="6858000" cy="9144000"/>
   <p:embeddedFontLst>
     <p:embeddedFont>
       <p:font typeface="HY중고딕" panose="02030600000101010101" pitchFamily="18" charset="-127"/>
-      <p:regular r:id="rId25"/>
+      <p:regular r:id="rId26"/>
     </p:embeddedFont>
     <p:embeddedFont>
       <p:font typeface="Malgun Gothic Semilight" panose="020B0502040204020203" pitchFamily="50" charset="-127"/>
-      <p:regular r:id="rId26"/>
+      <p:regular r:id="rId27"/>
     </p:embeddedFont>
     <p:embeddedFont>
       <p:font typeface="맑은 고딕" panose="020B0503020000020004" pitchFamily="50" charset="-127"/>
-      <p:regular r:id="rId27"/>
-      <p:bold r:id="rId28"/>
+      <p:regular r:id="rId28"/>
+      <p:bold r:id="rId29"/>
     </p:embeddedFont>
   </p:embeddedFontLst>
   <p:defaultTextStyle>
@@ -233,7 +234,7 @@
           <a:p>
             <a:fld id="{17FB36FB-C10C-479A-9DFD-15DEB134881C}" type="datetimeFigureOut">
               <a:rPr lang="ko-KR" altLang="en-US" smtClean="0"/>
-              <a:t>2019-04-14</a:t>
+              <a:t>2019-04-15</a:t>
             </a:fld>
             <a:endParaRPr lang="ko-KR" altLang="en-US"/>
           </a:p>
@@ -1820,20 +1821,13 @@
           <a:p>
             <a:pPr algn="ctr"/>
             <a:r>
-              <a:rPr lang="ko-KR" altLang="en-US">
+              <a:rPr lang="en-US" altLang="ko-KR" dirty="0">
                 <a:latin typeface="HY중고딕" panose="02030600000101010101" pitchFamily="18" charset="-127"/>
                 <a:ea typeface="HY중고딕" panose="02030600000101010101" pitchFamily="18" charset="-127"/>
               </a:rPr>
-              <a:t>내용을 입력하세요</a:t>
-            </a:r>
-            <a:r>
-              <a:rPr lang="en-US" altLang="ko-KR">
-                <a:latin typeface="HY중고딕" panose="02030600000101010101" pitchFamily="18" charset="-127"/>
-                <a:ea typeface="HY중고딕" panose="02030600000101010101" pitchFamily="18" charset="-127"/>
-              </a:rPr>
-              <a:t>.</a:t>
-            </a:r>
-            <a:endParaRPr lang="ko-KR" altLang="en-US">
+              <a:t>Context &amp; Use Case Diagrams</a:t>
+            </a:r>
+            <a:endParaRPr lang="ko-KR" altLang="en-US" dirty="0">
               <a:latin typeface="HY중고딕" panose="02030600000101010101" pitchFamily="18" charset="-127"/>
               <a:ea typeface="HY중고딕" panose="02030600000101010101" pitchFamily="18" charset="-127"/>
             </a:endParaRPr>
@@ -1870,49 +1864,6 @@
           <a:chExt cx="0" cy="0"/>
         </a:xfrm>
       </p:grpSpPr>
-      <p:sp>
-        <p:nvSpPr>
-          <p:cNvPr id="11" name="TextBox 10"/>
-          <p:cNvSpPr txBox="1"/>
-          <p:nvPr/>
-        </p:nvSpPr>
-        <p:spPr>
-          <a:xfrm>
-            <a:off x="2762588" y="2091297"/>
-            <a:ext cx="809003" cy="584775"/>
-          </a:xfrm>
-          <a:prstGeom prst="rect">
-            <a:avLst/>
-          </a:prstGeom>
-          <a:noFill/>
-        </p:spPr>
-        <p:txBody>
-          <a:bodyPr wrap="none" rtlCol="0">
-            <a:spAutoFit/>
-          </a:bodyPr>
-          <a:lstStyle/>
-          <a:p>
-            <a:pPr algn="ctr"/>
-            <a:r>
-              <a:rPr lang="en-US" altLang="ko-KR" sz="3200" spc="-150">
-                <a:solidFill>
-                  <a:srgbClr val="8DBABD"/>
-                </a:solidFill>
-                <a:latin typeface="Malgun Gothic Semilight" panose="020B0502040204020203" pitchFamily="34" charset="-127"/>
-                <a:ea typeface="Malgun Gothic Semilight" panose="020B0502040204020203" pitchFamily="34" charset="-127"/>
-              </a:rPr>
-              <a:t>Text</a:t>
-            </a:r>
-            <a:endParaRPr lang="ko-KR" altLang="en-US" sz="3200" spc="-150">
-              <a:solidFill>
-                <a:srgbClr val="8DBABD"/>
-              </a:solidFill>
-              <a:latin typeface="Malgun Gothic Semilight" panose="020B0502040204020203" pitchFamily="34" charset="-127"/>
-              <a:ea typeface="Malgun Gothic Semilight" panose="020B0502040204020203" pitchFamily="34" charset="-127"/>
-            </a:endParaRPr>
-          </a:p>
-        </p:txBody>
-      </p:sp>
       <p:cxnSp>
         <p:nvCxnSpPr>
           <p:cNvPr id="14" name="직선 연결선 13"/>
@@ -2088,13 +2039,15 @@
       <p:cxnSp>
         <p:nvCxnSpPr>
           <p:cNvPr id="18" name="직선 연결선 17"/>
-          <p:cNvCxnSpPr/>
+          <p:cNvCxnSpPr>
+            <a:cxnSpLocks/>
+          </p:cNvCxnSpPr>
           <p:nvPr/>
         </p:nvCxnSpPr>
         <p:spPr>
           <a:xfrm>
             <a:off x="1026522" y="989148"/>
-            <a:ext cx="2160000" cy="0"/>
+            <a:ext cx="6001276" cy="0"/>
           </a:xfrm>
           <a:prstGeom prst="line">
             <a:avLst/>
@@ -2130,8 +2083,8 @@
         </p:nvSpPr>
         <p:spPr>
           <a:xfrm>
-            <a:off x="1069515" y="437393"/>
-            <a:ext cx="2076786" cy="584775"/>
+            <a:off x="997647" y="422003"/>
+            <a:ext cx="5841471" cy="1077218"/>
           </a:xfrm>
           <a:prstGeom prst="rect">
             <a:avLst/>
@@ -2146,16 +2099,20 @@
           <a:p>
             <a:pPr algn="ctr"/>
             <a:r>
-              <a:rPr lang="en-US" altLang="ko-KR" sz="3200" spc="-150">
-                <a:solidFill>
-                  <a:srgbClr val="00002F"/>
-                </a:solidFill>
-                <a:latin typeface="Malgun Gothic Semilight" panose="020B0502040204020203" pitchFamily="34" charset="-127"/>
-                <a:ea typeface="Malgun Gothic Semilight" panose="020B0502040204020203" pitchFamily="34" charset="-127"/>
+              <a:rPr lang="en-US" altLang="ko-KR" sz="3200" dirty="0">
+                <a:latin typeface="나눔스퀘어 ExtraBold"/>
+                <a:ea typeface="HY중고딕" panose="02030600000101010101" pitchFamily="18" charset="-127"/>
               </a:rPr>
-              <a:t>CONTENTS</a:t>
-            </a:r>
-            <a:endParaRPr lang="ko-KR" altLang="en-US" sz="3200" spc="-150">
+              <a:t>Context &amp; Use Case Diagrams</a:t>
+            </a:r>
+            <a:endParaRPr lang="ko-KR" altLang="en-US" sz="3200" dirty="0">
+              <a:latin typeface="나눔스퀘어 ExtraBold"/>
+              <a:ea typeface="HY중고딕" panose="02030600000101010101" pitchFamily="18" charset="-127"/>
+            </a:endParaRPr>
+          </a:p>
+          <a:p>
+            <a:pPr algn="ctr"/>
+            <a:endParaRPr lang="ko-KR" altLang="en-US" sz="3200" spc="-150" dirty="0">
               <a:solidFill>
                 <a:srgbClr val="00002F"/>
               </a:solidFill>
@@ -2208,16 +2165,52 @@
           </a:p>
         </p:txBody>
       </p:sp>
+      <p:pic>
+        <p:nvPicPr>
+          <p:cNvPr id="6" name="Picture 5">
+            <a:extLst>
+              <a:ext uri="{FF2B5EF4-FFF2-40B4-BE49-F238E27FC236}">
+                <a16:creationId xmlns:a16="http://schemas.microsoft.com/office/drawing/2014/main" id="{AFCD180F-D6B3-407B-BA01-A7F2823DB9DD}"/>
+              </a:ext>
+            </a:extLst>
+          </p:cNvPr>
+          <p:cNvPicPr>
+            <a:picLocks noChangeAspect="1"/>
+          </p:cNvPicPr>
+          <p:nvPr/>
+        </p:nvPicPr>
+        <p:blipFill>
+          <a:blip r:embed="rId2"/>
+          <a:stretch>
+            <a:fillRect/>
+          </a:stretch>
+        </p:blipFill>
+        <p:spPr>
+          <a:xfrm>
+            <a:off x="628609" y="1262899"/>
+            <a:ext cx="10229850" cy="4981575"/>
+          </a:xfrm>
+          <a:prstGeom prst="rect">
+            <a:avLst/>
+          </a:prstGeom>
+        </p:spPr>
+      </p:pic>
       <p:sp>
         <p:nvSpPr>
-          <p:cNvPr id="21" name="TextBox 20"/>
+          <p:cNvPr id="7" name="TextBox 6">
+            <a:extLst>
+              <a:ext uri="{FF2B5EF4-FFF2-40B4-BE49-F238E27FC236}">
+                <a16:creationId xmlns:a16="http://schemas.microsoft.com/office/drawing/2014/main" id="{834398CF-428E-431B-AF86-1F2228F0CC32}"/>
+              </a:ext>
+            </a:extLst>
+          </p:cNvPr>
           <p:cNvSpPr txBox="1"/>
           <p:nvPr/>
         </p:nvSpPr>
         <p:spPr>
           <a:xfrm>
-            <a:off x="1108242" y="1006929"/>
-            <a:ext cx="501997" cy="369332"/>
+            <a:off x="4764099" y="6148892"/>
+            <a:ext cx="1958870" cy="369332"/>
           </a:xfrm>
           <a:prstGeom prst="rect">
             <a:avLst/>
@@ -2230,24 +2223,10 @@
           </a:bodyPr>
           <a:lstStyle/>
           <a:p>
-            <a:pPr algn="ctr"/>
-            <a:r>
-              <a:rPr lang="en-US" altLang="ko-KR" spc="-150">
-                <a:solidFill>
-                  <a:srgbClr val="00002F"/>
-                </a:solidFill>
-                <a:latin typeface="Malgun Gothic Semilight" panose="020B0502040204020203" pitchFamily="34" charset="-127"/>
-                <a:ea typeface="Malgun Gothic Semilight" panose="020B0502040204020203" pitchFamily="34" charset="-127"/>
-              </a:rPr>
-              <a:t>Text</a:t>
-            </a:r>
-            <a:endParaRPr lang="ko-KR" altLang="en-US" spc="-150">
-              <a:solidFill>
-                <a:srgbClr val="00002F"/>
-              </a:solidFill>
-              <a:latin typeface="Malgun Gothic Semilight" panose="020B0502040204020203" pitchFamily="34" charset="-127"/>
-              <a:ea typeface="Malgun Gothic Semilight" panose="020B0502040204020203" pitchFamily="34" charset="-127"/>
-            </a:endParaRPr>
+            <a:r>
+              <a:rPr lang="en-US" i="1" u="sng" dirty="0"/>
+              <a:t>Context Diagram</a:t>
+            </a:r>
           </a:p>
         </p:txBody>
       </p:sp>
@@ -2281,16 +2260,227 @@
           <a:chExt cx="0" cy="0"/>
         </a:xfrm>
       </p:grpSpPr>
+      <p:cxnSp>
+        <p:nvCxnSpPr>
+          <p:cNvPr id="14" name="직선 연결선 13"/>
+          <p:cNvCxnSpPr/>
+          <p:nvPr/>
+        </p:nvCxnSpPr>
+        <p:spPr>
+          <a:xfrm>
+            <a:off x="10430892" y="144941"/>
+            <a:ext cx="360000" cy="0"/>
+          </a:xfrm>
+          <a:prstGeom prst="line">
+            <a:avLst/>
+          </a:prstGeom>
+          <a:ln w="44450" cap="rnd">
+            <a:solidFill>
+              <a:srgbClr val="D0CECE"/>
+            </a:solidFill>
+          </a:ln>
+          <a:effectLst>
+            <a:outerShdw blurRad="50800" dist="38100" dir="5400000" algn="t" rotWithShape="0">
+              <a:prstClr val="black">
+                <a:alpha val="40000"/>
+              </a:prstClr>
+            </a:outerShdw>
+          </a:effectLst>
+        </p:spPr>
+        <p:style>
+          <a:lnRef idx="1">
+            <a:schemeClr val="accent1"/>
+          </a:lnRef>
+          <a:fillRef idx="0">
+            <a:schemeClr val="accent1"/>
+          </a:fillRef>
+          <a:effectRef idx="0">
+            <a:schemeClr val="accent1"/>
+          </a:effectRef>
+          <a:fontRef idx="minor">
+            <a:schemeClr val="tx1"/>
+          </a:fontRef>
+        </p:style>
+      </p:cxnSp>
+      <p:cxnSp>
+        <p:nvCxnSpPr>
+          <p:cNvPr id="15" name="직선 연결선 14"/>
+          <p:cNvCxnSpPr/>
+          <p:nvPr/>
+        </p:nvCxnSpPr>
+        <p:spPr>
+          <a:xfrm>
+            <a:off x="10858459" y="144941"/>
+            <a:ext cx="360000" cy="0"/>
+          </a:xfrm>
+          <a:prstGeom prst="line">
+            <a:avLst/>
+          </a:prstGeom>
+          <a:ln w="44450" cap="rnd">
+            <a:solidFill>
+              <a:schemeClr val="bg2">
+                <a:lumMod val="90000"/>
+              </a:schemeClr>
+            </a:solidFill>
+          </a:ln>
+          <a:effectLst>
+            <a:outerShdw blurRad="50800" dist="38100" dir="5400000" algn="t" rotWithShape="0">
+              <a:prstClr val="black">
+                <a:alpha val="40000"/>
+              </a:prstClr>
+            </a:outerShdw>
+          </a:effectLst>
+        </p:spPr>
+        <p:style>
+          <a:lnRef idx="1">
+            <a:schemeClr val="accent1"/>
+          </a:lnRef>
+          <a:fillRef idx="0">
+            <a:schemeClr val="accent1"/>
+          </a:fillRef>
+          <a:effectRef idx="0">
+            <a:schemeClr val="accent1"/>
+          </a:effectRef>
+          <a:fontRef idx="minor">
+            <a:schemeClr val="tx1"/>
+          </a:fontRef>
+        </p:style>
+      </p:cxnSp>
+      <p:cxnSp>
+        <p:nvCxnSpPr>
+          <p:cNvPr id="16" name="직선 연결선 15"/>
+          <p:cNvCxnSpPr/>
+          <p:nvPr/>
+        </p:nvCxnSpPr>
+        <p:spPr>
+          <a:xfrm>
+            <a:off x="11286026" y="144941"/>
+            <a:ext cx="360000" cy="0"/>
+          </a:xfrm>
+          <a:prstGeom prst="line">
+            <a:avLst/>
+          </a:prstGeom>
+          <a:ln w="44450" cap="rnd">
+            <a:solidFill>
+              <a:schemeClr val="bg2">
+                <a:lumMod val="90000"/>
+              </a:schemeClr>
+            </a:solidFill>
+          </a:ln>
+          <a:effectLst>
+            <a:outerShdw blurRad="50800" dist="38100" dir="5400000" algn="t" rotWithShape="0">
+              <a:prstClr val="black">
+                <a:alpha val="40000"/>
+              </a:prstClr>
+            </a:outerShdw>
+          </a:effectLst>
+        </p:spPr>
+        <p:style>
+          <a:lnRef idx="1">
+            <a:schemeClr val="accent1"/>
+          </a:lnRef>
+          <a:fillRef idx="0">
+            <a:schemeClr val="accent1"/>
+          </a:fillRef>
+          <a:effectRef idx="0">
+            <a:schemeClr val="accent1"/>
+          </a:effectRef>
+          <a:fontRef idx="minor">
+            <a:schemeClr val="tx1"/>
+          </a:fontRef>
+        </p:style>
+      </p:cxnSp>
+      <p:cxnSp>
+        <p:nvCxnSpPr>
+          <p:cNvPr id="17" name="직선 연결선 16"/>
+          <p:cNvCxnSpPr/>
+          <p:nvPr/>
+        </p:nvCxnSpPr>
+        <p:spPr>
+          <a:xfrm>
+            <a:off x="11713592" y="144941"/>
+            <a:ext cx="360000" cy="0"/>
+          </a:xfrm>
+          <a:prstGeom prst="line">
+            <a:avLst/>
+          </a:prstGeom>
+          <a:ln w="44450" cap="rnd">
+            <a:solidFill>
+              <a:srgbClr val="8DBABD"/>
+            </a:solidFill>
+          </a:ln>
+          <a:effectLst>
+            <a:outerShdw blurRad="50800" dist="38100" dir="5400000" algn="t" rotWithShape="0">
+              <a:prstClr val="black">
+                <a:alpha val="40000"/>
+              </a:prstClr>
+            </a:outerShdw>
+          </a:effectLst>
+        </p:spPr>
+        <p:style>
+          <a:lnRef idx="1">
+            <a:schemeClr val="accent1"/>
+          </a:lnRef>
+          <a:fillRef idx="0">
+            <a:schemeClr val="accent1"/>
+          </a:fillRef>
+          <a:effectRef idx="0">
+            <a:schemeClr val="accent1"/>
+          </a:effectRef>
+          <a:fontRef idx="minor">
+            <a:schemeClr val="tx1"/>
+          </a:fontRef>
+        </p:style>
+      </p:cxnSp>
+      <p:cxnSp>
+        <p:nvCxnSpPr>
+          <p:cNvPr id="18" name="직선 연결선 17"/>
+          <p:cNvCxnSpPr>
+            <a:cxnSpLocks/>
+          </p:cNvCxnSpPr>
+          <p:nvPr/>
+        </p:nvCxnSpPr>
+        <p:spPr>
+          <a:xfrm>
+            <a:off x="1026522" y="989148"/>
+            <a:ext cx="6001276" cy="0"/>
+          </a:xfrm>
+          <a:prstGeom prst="line">
+            <a:avLst/>
+          </a:prstGeom>
+          <a:ln>
+            <a:solidFill>
+              <a:schemeClr val="bg1">
+                <a:lumMod val="50000"/>
+              </a:schemeClr>
+            </a:solidFill>
+          </a:ln>
+        </p:spPr>
+        <p:style>
+          <a:lnRef idx="1">
+            <a:schemeClr val="accent1"/>
+          </a:lnRef>
+          <a:fillRef idx="0">
+            <a:schemeClr val="accent1"/>
+          </a:fillRef>
+          <a:effectRef idx="0">
+            <a:schemeClr val="accent1"/>
+          </a:effectRef>
+          <a:fontRef idx="minor">
+            <a:schemeClr val="tx1"/>
+          </a:fontRef>
+        </p:style>
+      </p:cxnSp>
       <p:sp>
         <p:nvSpPr>
-          <p:cNvPr id="2" name="TextBox 1"/>
+          <p:cNvPr id="19" name="TextBox 18"/>
           <p:cNvSpPr txBox="1"/>
           <p:nvPr/>
         </p:nvSpPr>
         <p:spPr>
           <a:xfrm>
-            <a:off x="4000500" y="2472873"/>
-            <a:ext cx="764953" cy="769441"/>
+            <a:off x="997647" y="422003"/>
+            <a:ext cx="5841471" cy="1077218"/>
           </a:xfrm>
           <a:prstGeom prst="rect">
             <a:avLst/>
@@ -2303,102 +2493,142 @@
           </a:bodyPr>
           <a:lstStyle/>
           <a:p>
-            <a:r>
-              <a:rPr lang="en-US" altLang="ko-KR" sz="4400" spc="-300" dirty="0">
-                <a:solidFill>
-                  <a:srgbClr val="00002F"/>
-                </a:solidFill>
-                <a:latin typeface="HY중고딕" panose="02030600000101010101" pitchFamily="18" charset="-127"/>
+            <a:pPr algn="ctr"/>
+            <a:r>
+              <a:rPr lang="en-US" altLang="ko-KR" sz="3200" dirty="0">
+                <a:latin typeface="나눔스퀘어 ExtraBold"/>
                 <a:ea typeface="HY중고딕" panose="02030600000101010101" pitchFamily="18" charset="-127"/>
               </a:rPr>
-              <a:t>05</a:t>
-            </a:r>
-            <a:endParaRPr lang="ko-KR" altLang="en-US" sz="4400" spc="-300" dirty="0">
+              <a:t>Context &amp; Use Case Diagrams</a:t>
+            </a:r>
+            <a:endParaRPr lang="ko-KR" altLang="en-US" sz="3200" dirty="0">
+              <a:latin typeface="나눔스퀘어 ExtraBold"/>
+              <a:ea typeface="HY중고딕" panose="02030600000101010101" pitchFamily="18" charset="-127"/>
+            </a:endParaRPr>
+          </a:p>
+          <a:p>
+            <a:pPr algn="ctr"/>
+            <a:endParaRPr lang="ko-KR" altLang="en-US" sz="3200" spc="-150" dirty="0">
               <a:solidFill>
                 <a:srgbClr val="00002F"/>
               </a:solidFill>
-              <a:latin typeface="HY중고딕" panose="02030600000101010101" pitchFamily="18" charset="-127"/>
-              <a:ea typeface="HY중고딕" panose="02030600000101010101" pitchFamily="18" charset="-127"/>
+              <a:latin typeface="Malgun Gothic Semilight" panose="020B0502040204020203" pitchFamily="34" charset="-127"/>
+              <a:ea typeface="Malgun Gothic Semilight" panose="020B0502040204020203" pitchFamily="34" charset="-127"/>
             </a:endParaRPr>
           </a:p>
         </p:txBody>
       </p:sp>
       <p:sp>
         <p:nvSpPr>
-          <p:cNvPr id="3" name="직사각형 2"/>
-          <p:cNvSpPr/>
+          <p:cNvPr id="20" name="TextBox 19"/>
+          <p:cNvSpPr txBox="1"/>
           <p:nvPr/>
         </p:nvSpPr>
         <p:spPr>
           <a:xfrm>
-            <a:off x="4000499" y="3169741"/>
-            <a:ext cx="4200071" cy="473345"/>
+            <a:off x="496409" y="498947"/>
+            <a:ext cx="532517" cy="461665"/>
           </a:xfrm>
           <a:prstGeom prst="rect">
             <a:avLst/>
           </a:prstGeom>
-          <a:solidFill>
-            <a:srgbClr val="8DBABD"/>
-          </a:solidFill>
-          <a:ln>
-            <a:solidFill>
-              <a:srgbClr val="8DBABD"/>
-            </a:solidFill>
-          </a:ln>
-        </p:spPr>
-        <p:style>
-          <a:lnRef idx="2">
-            <a:schemeClr val="accent1">
-              <a:shade val="50000"/>
-            </a:schemeClr>
-          </a:lnRef>
-          <a:fillRef idx="1">
-            <a:schemeClr val="accent1"/>
-          </a:fillRef>
-          <a:effectRef idx="0">
-            <a:schemeClr val="accent1"/>
-          </a:effectRef>
-          <a:fontRef idx="minor">
-            <a:schemeClr val="lt1"/>
-          </a:fontRef>
-        </p:style>
+          <a:noFill/>
+        </p:spPr>
         <p:txBody>
-          <a:bodyPr rtlCol="0" anchor="ctr"/>
+          <a:bodyPr wrap="none" rtlCol="0">
+            <a:spAutoFit/>
+          </a:bodyPr>
           <a:lstStyle/>
           <a:p>
             <a:pPr algn="ctr"/>
             <a:r>
-              <a:rPr lang="en-US" altLang="ko-KR" dirty="0">
-                <a:latin typeface="HY중고딕" panose="02030600000101010101" pitchFamily="18" charset="-127"/>
-                <a:ea typeface="HY중고딕" panose="02030600000101010101" pitchFamily="18" charset="-127"/>
+              <a:rPr lang="en-US" altLang="ko-KR" sz="2400" spc="-150">
+                <a:solidFill>
+                  <a:srgbClr val="00002F"/>
+                </a:solidFill>
+                <a:latin typeface="Malgun Gothic Semilight" panose="020B0502040204020203" pitchFamily="34" charset="-127"/>
+                <a:ea typeface="Malgun Gothic Semilight" panose="020B0502040204020203" pitchFamily="34" charset="-127"/>
               </a:rPr>
-              <a:t>Architectural</a:t>
-            </a:r>
-            <a:r>
-              <a:rPr lang="ko-KR" altLang="en-US" dirty="0">
-                <a:latin typeface="HY중고딕" panose="02030600000101010101" pitchFamily="18" charset="-127"/>
-                <a:ea typeface="HY중고딕" panose="02030600000101010101" pitchFamily="18" charset="-127"/>
-              </a:rPr>
-              <a:t> </a:t>
-            </a:r>
-            <a:r>
-              <a:rPr lang="en-US" altLang="ko-KR" dirty="0">
-                <a:latin typeface="HY중고딕" panose="02030600000101010101" pitchFamily="18" charset="-127"/>
-                <a:ea typeface="HY중고딕" panose="02030600000101010101" pitchFamily="18" charset="-127"/>
-              </a:rPr>
-              <a:t>Model</a:t>
-            </a:r>
-            <a:endParaRPr lang="ko-KR" altLang="en-US" dirty="0">
-              <a:latin typeface="HY중고딕" panose="02030600000101010101" pitchFamily="18" charset="-127"/>
-              <a:ea typeface="HY중고딕" panose="02030600000101010101" pitchFamily="18" charset="-127"/>
+              <a:t>04.</a:t>
+            </a:r>
+            <a:endParaRPr lang="ko-KR" altLang="en-US" sz="2400" spc="-150">
+              <a:solidFill>
+                <a:srgbClr val="00002F"/>
+              </a:solidFill>
+              <a:latin typeface="Malgun Gothic Semilight" panose="020B0502040204020203" pitchFamily="34" charset="-127"/>
+              <a:ea typeface="Malgun Gothic Semilight" panose="020B0502040204020203" pitchFamily="34" charset="-127"/>
             </a:endParaRPr>
           </a:p>
         </p:txBody>
       </p:sp>
+      <p:sp>
+        <p:nvSpPr>
+          <p:cNvPr id="7" name="TextBox 6">
+            <a:extLst>
+              <a:ext uri="{FF2B5EF4-FFF2-40B4-BE49-F238E27FC236}">
+                <a16:creationId xmlns:a16="http://schemas.microsoft.com/office/drawing/2014/main" id="{834398CF-428E-431B-AF86-1F2228F0CC32}"/>
+              </a:ext>
+            </a:extLst>
+          </p:cNvPr>
+          <p:cNvSpPr txBox="1"/>
+          <p:nvPr/>
+        </p:nvSpPr>
+        <p:spPr>
+          <a:xfrm>
+            <a:off x="9860619" y="3685638"/>
+            <a:ext cx="2108269" cy="369332"/>
+          </a:xfrm>
+          <a:prstGeom prst="rect">
+            <a:avLst/>
+          </a:prstGeom>
+          <a:noFill/>
+        </p:spPr>
+        <p:txBody>
+          <a:bodyPr wrap="none" rtlCol="0">
+            <a:spAutoFit/>
+          </a:bodyPr>
+          <a:lstStyle/>
+          <a:p>
+            <a:r>
+              <a:rPr lang="en-US" i="1" u="sng" dirty="0"/>
+              <a:t>Use Case Diagram</a:t>
+            </a:r>
+          </a:p>
+        </p:txBody>
+      </p:sp>
+      <p:pic>
+        <p:nvPicPr>
+          <p:cNvPr id="2" name="Picture 1">
+            <a:extLst>
+              <a:ext uri="{FF2B5EF4-FFF2-40B4-BE49-F238E27FC236}">
+                <a16:creationId xmlns:a16="http://schemas.microsoft.com/office/drawing/2014/main" id="{6EFCC753-42FC-4514-AE32-B5A1986F496D}"/>
+              </a:ext>
+            </a:extLst>
+          </p:cNvPr>
+          <p:cNvPicPr>
+            <a:picLocks noChangeAspect="1"/>
+          </p:cNvPicPr>
+          <p:nvPr/>
+        </p:nvPicPr>
+        <p:blipFill rotWithShape="1">
+          <a:blip r:embed="rId2"/>
+          <a:srcRect l="2116" t="1554" r="1897" b="1149"/>
+          <a:stretch/>
+        </p:blipFill>
+        <p:spPr>
+          <a:xfrm>
+            <a:off x="223112" y="1037556"/>
+            <a:ext cx="9666612" cy="5665497"/>
+          </a:xfrm>
+          <a:prstGeom prst="rect">
+            <a:avLst/>
+          </a:prstGeom>
+        </p:spPr>
+      </p:pic>
     </p:spTree>
     <p:extLst>
       <p:ext uri="{BB962C8B-B14F-4D97-AF65-F5344CB8AC3E}">
-        <p14:creationId xmlns:p14="http://schemas.microsoft.com/office/powerpoint/2010/main" val="2831566107"/>
+        <p14:creationId xmlns:p14="http://schemas.microsoft.com/office/powerpoint/2010/main" val="3837813581"/>
       </p:ext>
     </p:extLst>
   </p:cSld>
@@ -2427,14 +2657,14 @@
       </p:grpSpPr>
       <p:sp>
         <p:nvSpPr>
-          <p:cNvPr id="11" name="TextBox 10"/>
+          <p:cNvPr id="2" name="TextBox 1"/>
           <p:cNvSpPr txBox="1"/>
           <p:nvPr/>
         </p:nvSpPr>
         <p:spPr>
           <a:xfrm>
-            <a:off x="3799480" y="1232977"/>
-            <a:ext cx="4439036" cy="707886"/>
+            <a:off x="4000500" y="2472873"/>
+            <a:ext cx="764953" cy="769441"/>
           </a:xfrm>
           <a:prstGeom prst="rect">
             <a:avLst/>
@@ -2447,561 +2677,94 @@
           </a:bodyPr>
           <a:lstStyle/>
           <a:p>
-            <a:pPr algn="ctr"/>
-            <a:r>
-              <a:rPr lang="en-US" altLang="ko-KR" sz="4000" b="1" spc="-150" dirty="0">
-                <a:solidFill>
-                  <a:srgbClr val="8DBABD"/>
-                </a:solidFill>
-                <a:latin typeface="Malgun Gothic Semilight" panose="020B0502040204020203" pitchFamily="34" charset="-127"/>
-                <a:ea typeface="Malgun Gothic Semilight" panose="020B0502040204020203" pitchFamily="34" charset="-127"/>
-              </a:rPr>
-              <a:t>Layered Architecture</a:t>
-            </a:r>
-            <a:endParaRPr lang="ko-KR" altLang="en-US" sz="4000" b="1" spc="-150" dirty="0">
-              <a:solidFill>
-                <a:srgbClr val="8DBABD"/>
-              </a:solidFill>
-              <a:latin typeface="Malgun Gothic Semilight" panose="020B0502040204020203" pitchFamily="34" charset="-127"/>
-              <a:ea typeface="Malgun Gothic Semilight" panose="020B0502040204020203" pitchFamily="34" charset="-127"/>
-            </a:endParaRPr>
-          </a:p>
-        </p:txBody>
-      </p:sp>
-      <p:cxnSp>
-        <p:nvCxnSpPr>
-          <p:cNvPr id="14" name="직선 연결선 13"/>
-          <p:cNvCxnSpPr/>
-          <p:nvPr/>
-        </p:nvCxnSpPr>
-        <p:spPr>
-          <a:xfrm>
-            <a:off x="10430892" y="144941"/>
-            <a:ext cx="360000" cy="0"/>
-          </a:xfrm>
-          <a:prstGeom prst="line">
-            <a:avLst/>
-          </a:prstGeom>
-          <a:ln w="44450" cap="rnd">
-            <a:solidFill>
-              <a:srgbClr val="D0CECE"/>
-            </a:solidFill>
-          </a:ln>
-          <a:effectLst>
-            <a:outerShdw blurRad="50800" dist="38100" dir="5400000" algn="t" rotWithShape="0">
-              <a:prstClr val="black">
-                <a:alpha val="40000"/>
-              </a:prstClr>
-            </a:outerShdw>
-          </a:effectLst>
-        </p:spPr>
-        <p:style>
-          <a:lnRef idx="1">
-            <a:schemeClr val="accent1"/>
-          </a:lnRef>
-          <a:fillRef idx="0">
-            <a:schemeClr val="accent1"/>
-          </a:fillRef>
-          <a:effectRef idx="0">
-            <a:schemeClr val="accent1"/>
-          </a:effectRef>
-          <a:fontRef idx="minor">
-            <a:schemeClr val="tx1"/>
-          </a:fontRef>
-        </p:style>
-      </p:cxnSp>
-      <p:cxnSp>
-        <p:nvCxnSpPr>
-          <p:cNvPr id="15" name="직선 연결선 14"/>
-          <p:cNvCxnSpPr/>
-          <p:nvPr/>
-        </p:nvCxnSpPr>
-        <p:spPr>
-          <a:xfrm>
-            <a:off x="10858459" y="144941"/>
-            <a:ext cx="360000" cy="0"/>
-          </a:xfrm>
-          <a:prstGeom prst="line">
-            <a:avLst/>
-          </a:prstGeom>
-          <a:ln w="44450" cap="rnd">
-            <a:solidFill>
-              <a:schemeClr val="bg2">
-                <a:lumMod val="90000"/>
-              </a:schemeClr>
-            </a:solidFill>
-          </a:ln>
-          <a:effectLst>
-            <a:outerShdw blurRad="50800" dist="38100" dir="5400000" algn="t" rotWithShape="0">
-              <a:prstClr val="black">
-                <a:alpha val="40000"/>
-              </a:prstClr>
-            </a:outerShdw>
-          </a:effectLst>
-        </p:spPr>
-        <p:style>
-          <a:lnRef idx="1">
-            <a:schemeClr val="accent1"/>
-          </a:lnRef>
-          <a:fillRef idx="0">
-            <a:schemeClr val="accent1"/>
-          </a:fillRef>
-          <a:effectRef idx="0">
-            <a:schemeClr val="accent1"/>
-          </a:effectRef>
-          <a:fontRef idx="minor">
-            <a:schemeClr val="tx1"/>
-          </a:fontRef>
-        </p:style>
-      </p:cxnSp>
-      <p:cxnSp>
-        <p:nvCxnSpPr>
-          <p:cNvPr id="16" name="직선 연결선 15"/>
-          <p:cNvCxnSpPr/>
-          <p:nvPr/>
-        </p:nvCxnSpPr>
-        <p:spPr>
-          <a:xfrm>
-            <a:off x="11286026" y="144941"/>
-            <a:ext cx="360000" cy="0"/>
-          </a:xfrm>
-          <a:prstGeom prst="line">
-            <a:avLst/>
-          </a:prstGeom>
-          <a:ln w="44450" cap="rnd">
-            <a:solidFill>
-              <a:schemeClr val="bg2">
-                <a:lumMod val="90000"/>
-              </a:schemeClr>
-            </a:solidFill>
-          </a:ln>
-          <a:effectLst>
-            <a:outerShdw blurRad="50800" dist="38100" dir="5400000" algn="t" rotWithShape="0">
-              <a:prstClr val="black">
-                <a:alpha val="40000"/>
-              </a:prstClr>
-            </a:outerShdw>
-          </a:effectLst>
-        </p:spPr>
-        <p:style>
-          <a:lnRef idx="1">
-            <a:schemeClr val="accent1"/>
-          </a:lnRef>
-          <a:fillRef idx="0">
-            <a:schemeClr val="accent1"/>
-          </a:fillRef>
-          <a:effectRef idx="0">
-            <a:schemeClr val="accent1"/>
-          </a:effectRef>
-          <a:fontRef idx="minor">
-            <a:schemeClr val="tx1"/>
-          </a:fontRef>
-        </p:style>
-      </p:cxnSp>
-      <p:cxnSp>
-        <p:nvCxnSpPr>
-          <p:cNvPr id="17" name="직선 연결선 16"/>
-          <p:cNvCxnSpPr/>
-          <p:nvPr/>
-        </p:nvCxnSpPr>
-        <p:spPr>
-          <a:xfrm>
-            <a:off x="11713592" y="144941"/>
-            <a:ext cx="360000" cy="0"/>
-          </a:xfrm>
-          <a:prstGeom prst="line">
-            <a:avLst/>
-          </a:prstGeom>
-          <a:ln w="44450" cap="rnd">
-            <a:solidFill>
-              <a:srgbClr val="8DBABD"/>
-            </a:solidFill>
-          </a:ln>
-          <a:effectLst>
-            <a:outerShdw blurRad="50800" dist="38100" dir="5400000" algn="t" rotWithShape="0">
-              <a:prstClr val="black">
-                <a:alpha val="40000"/>
-              </a:prstClr>
-            </a:outerShdw>
-          </a:effectLst>
-        </p:spPr>
-        <p:style>
-          <a:lnRef idx="1">
-            <a:schemeClr val="accent1"/>
-          </a:lnRef>
-          <a:fillRef idx="0">
-            <a:schemeClr val="accent1"/>
-          </a:fillRef>
-          <a:effectRef idx="0">
-            <a:schemeClr val="accent1"/>
-          </a:effectRef>
-          <a:fontRef idx="minor">
-            <a:schemeClr val="tx1"/>
-          </a:fontRef>
-        </p:style>
-      </p:cxnSp>
-      <p:cxnSp>
-        <p:nvCxnSpPr>
-          <p:cNvPr id="18" name="직선 연결선 17"/>
-          <p:cNvCxnSpPr>
-            <a:cxnSpLocks/>
-          </p:cNvCxnSpPr>
-          <p:nvPr/>
-        </p:nvCxnSpPr>
-        <p:spPr>
-          <a:xfrm>
-            <a:off x="1026522" y="989148"/>
-            <a:ext cx="3258731" cy="0"/>
-          </a:xfrm>
-          <a:prstGeom prst="line">
-            <a:avLst/>
-          </a:prstGeom>
-          <a:ln>
-            <a:solidFill>
-              <a:schemeClr val="bg1">
-                <a:lumMod val="50000"/>
-              </a:schemeClr>
-            </a:solidFill>
-          </a:ln>
-        </p:spPr>
-        <p:style>
-          <a:lnRef idx="1">
-            <a:schemeClr val="accent1"/>
-          </a:lnRef>
-          <a:fillRef idx="0">
-            <a:schemeClr val="accent1"/>
-          </a:fillRef>
-          <a:effectRef idx="0">
-            <a:schemeClr val="accent1"/>
-          </a:effectRef>
-          <a:fontRef idx="minor">
-            <a:schemeClr val="tx1"/>
-          </a:fontRef>
-        </p:style>
-      </p:cxnSp>
-      <p:sp>
-        <p:nvSpPr>
-          <p:cNvPr id="19" name="TextBox 18"/>
-          <p:cNvSpPr txBox="1"/>
-          <p:nvPr/>
-        </p:nvSpPr>
-        <p:spPr>
-          <a:xfrm>
-            <a:off x="937862" y="422154"/>
-            <a:ext cx="3347391" cy="584775"/>
-          </a:xfrm>
-          <a:prstGeom prst="rect">
-            <a:avLst/>
-          </a:prstGeom>
-          <a:noFill/>
-        </p:spPr>
-        <p:txBody>
-          <a:bodyPr wrap="none" rtlCol="0">
-            <a:spAutoFit/>
-          </a:bodyPr>
-          <a:lstStyle/>
-          <a:p>
-            <a:pPr algn="ctr"/>
-            <a:r>
-              <a:rPr lang="en-US" altLang="ko-KR" sz="3200" spc="-150" dirty="0">
+            <a:r>
+              <a:rPr lang="en-US" altLang="ko-KR" sz="4400" spc="-300" dirty="0">
                 <a:solidFill>
                   <a:srgbClr val="00002F"/>
                 </a:solidFill>
-                <a:latin typeface="Malgun Gothic Semilight" panose="020B0502040204020203" pitchFamily="34" charset="-127"/>
-                <a:ea typeface="Malgun Gothic Semilight" panose="020B0502040204020203" pitchFamily="34" charset="-127"/>
+                <a:latin typeface="HY중고딕" panose="02030600000101010101" pitchFamily="18" charset="-127"/>
+                <a:ea typeface="HY중고딕" panose="02030600000101010101" pitchFamily="18" charset="-127"/>
               </a:rPr>
-              <a:t>Architectural Model</a:t>
-            </a:r>
-            <a:endParaRPr lang="ko-KR" altLang="en-US" sz="3200" spc="-150" dirty="0">
+              <a:t>05</a:t>
+            </a:r>
+            <a:endParaRPr lang="ko-KR" altLang="en-US" sz="4400" spc="-300" dirty="0">
               <a:solidFill>
                 <a:srgbClr val="00002F"/>
               </a:solidFill>
-              <a:latin typeface="Malgun Gothic Semilight" panose="020B0502040204020203" pitchFamily="34" charset="-127"/>
-              <a:ea typeface="Malgun Gothic Semilight" panose="020B0502040204020203" pitchFamily="34" charset="-127"/>
+              <a:latin typeface="HY중고딕" panose="02030600000101010101" pitchFamily="18" charset="-127"/>
+              <a:ea typeface="HY중고딕" panose="02030600000101010101" pitchFamily="18" charset="-127"/>
             </a:endParaRPr>
           </a:p>
         </p:txBody>
       </p:sp>
       <p:sp>
         <p:nvSpPr>
-          <p:cNvPr id="20" name="TextBox 19"/>
-          <p:cNvSpPr txBox="1"/>
+          <p:cNvPr id="3" name="직사각형 2"/>
+          <p:cNvSpPr/>
           <p:nvPr/>
         </p:nvSpPr>
         <p:spPr>
           <a:xfrm>
-            <a:off x="496409" y="498947"/>
-            <a:ext cx="532517" cy="461665"/>
+            <a:off x="4000499" y="3169741"/>
+            <a:ext cx="4200071" cy="473345"/>
           </a:xfrm>
           <a:prstGeom prst="rect">
             <a:avLst/>
           </a:prstGeom>
-          <a:noFill/>
-        </p:spPr>
+          <a:solidFill>
+            <a:srgbClr val="8DBABD"/>
+          </a:solidFill>
+          <a:ln>
+            <a:solidFill>
+              <a:srgbClr val="8DBABD"/>
+            </a:solidFill>
+          </a:ln>
+        </p:spPr>
+        <p:style>
+          <a:lnRef idx="2">
+            <a:schemeClr val="accent1">
+              <a:shade val="50000"/>
+            </a:schemeClr>
+          </a:lnRef>
+          <a:fillRef idx="1">
+            <a:schemeClr val="accent1"/>
+          </a:fillRef>
+          <a:effectRef idx="0">
+            <a:schemeClr val="accent1"/>
+          </a:effectRef>
+          <a:fontRef idx="minor">
+            <a:schemeClr val="lt1"/>
+          </a:fontRef>
+        </p:style>
         <p:txBody>
-          <a:bodyPr wrap="none" rtlCol="0">
-            <a:spAutoFit/>
-          </a:bodyPr>
+          <a:bodyPr rtlCol="0" anchor="ctr"/>
           <a:lstStyle/>
           <a:p>
             <a:pPr algn="ctr"/>
             <a:r>
-              <a:rPr lang="en-US" altLang="ko-KR" sz="2400" spc="-150" dirty="0">
-                <a:solidFill>
-                  <a:srgbClr val="00002F"/>
-                </a:solidFill>
-                <a:latin typeface="Malgun Gothic Semilight" panose="020B0502040204020203" pitchFamily="34" charset="-127"/>
-                <a:ea typeface="Malgun Gothic Semilight" panose="020B0502040204020203" pitchFamily="34" charset="-127"/>
+              <a:rPr lang="en-US" altLang="ko-KR" dirty="0">
+                <a:latin typeface="HY중고딕" panose="02030600000101010101" pitchFamily="18" charset="-127"/>
+                <a:ea typeface="HY중고딕" panose="02030600000101010101" pitchFamily="18" charset="-127"/>
               </a:rPr>
-              <a:t>05.</a:t>
-            </a:r>
-            <a:endParaRPr lang="ko-KR" altLang="en-US" sz="2400" spc="-150" dirty="0">
-              <a:solidFill>
-                <a:srgbClr val="00002F"/>
-              </a:solidFill>
-              <a:latin typeface="Malgun Gothic Semilight" panose="020B0502040204020203" pitchFamily="34" charset="-127"/>
-              <a:ea typeface="Malgun Gothic Semilight" panose="020B0502040204020203" pitchFamily="34" charset="-127"/>
-            </a:endParaRPr>
-          </a:p>
-        </p:txBody>
-      </p:sp>
-      <p:pic>
-        <p:nvPicPr>
-          <p:cNvPr id="4" name="Picture 3">
-            <a:extLst>
-              <a:ext uri="{FF2B5EF4-FFF2-40B4-BE49-F238E27FC236}">
-                <a16:creationId xmlns:a16="http://schemas.microsoft.com/office/drawing/2014/main" id="{78A9E877-2873-4F14-9587-FF3FB0EFE392}"/>
-              </a:ext>
-            </a:extLst>
-          </p:cNvPr>
-          <p:cNvPicPr>
-            <a:picLocks noChangeAspect="1"/>
-          </p:cNvPicPr>
-          <p:nvPr/>
-        </p:nvPicPr>
-        <p:blipFill rotWithShape="1">
-          <a:blip r:embed="rId2"/>
-          <a:srcRect l="2390" t="3977" r="2924" b="4358"/>
-          <a:stretch/>
-        </p:blipFill>
-        <p:spPr>
-          <a:xfrm>
-            <a:off x="2853801" y="2117555"/>
-            <a:ext cx="6290200" cy="4090737"/>
-          </a:xfrm>
-          <a:prstGeom prst="rect">
-            <a:avLst/>
-          </a:prstGeom>
-        </p:spPr>
-      </p:pic>
-      <p:sp>
-        <p:nvSpPr>
-          <p:cNvPr id="5" name="TextBox 4">
-            <a:extLst>
-              <a:ext uri="{FF2B5EF4-FFF2-40B4-BE49-F238E27FC236}">
-                <a16:creationId xmlns:a16="http://schemas.microsoft.com/office/drawing/2014/main" id="{CB3D56C9-6CCA-4F0B-A41E-CAA4A52CE0E6}"/>
-              </a:ext>
-            </a:extLst>
-          </p:cNvPr>
-          <p:cNvSpPr txBox="1"/>
-          <p:nvPr/>
-        </p:nvSpPr>
-        <p:spPr>
-          <a:xfrm>
-            <a:off x="4321584" y="1988742"/>
-            <a:ext cx="3202317" cy="816955"/>
-          </a:xfrm>
-          <a:prstGeom prst="rect">
-            <a:avLst/>
-          </a:prstGeom>
-          <a:noFill/>
-        </p:spPr>
-        <p:txBody>
-          <a:bodyPr wrap="square" rtlCol="0">
-            <a:spAutoFit/>
-          </a:bodyPr>
-          <a:lstStyle/>
-          <a:p>
-            <a:pPr algn="ctr">
-              <a:lnSpc>
-                <a:spcPct val="200000"/>
-              </a:lnSpc>
-            </a:pPr>
-            <a:r>
-              <a:rPr lang="en-US" sz="2800" spc="-150" dirty="0">
-                <a:latin typeface="Malgun Gothic Semilight" panose="020B0503020000020004" pitchFamily="34" charset="-127"/>
-                <a:ea typeface="Malgun Gothic Semilight" panose="020B0503020000020004" pitchFamily="34" charset="-127"/>
-              </a:rPr>
-              <a:t>User Interface (I/O)</a:t>
-            </a:r>
-          </a:p>
-        </p:txBody>
-      </p:sp>
-      <p:sp>
-        <p:nvSpPr>
-          <p:cNvPr id="22" name="TextBox 21">
-            <a:extLst>
-              <a:ext uri="{FF2B5EF4-FFF2-40B4-BE49-F238E27FC236}">
-                <a16:creationId xmlns:a16="http://schemas.microsoft.com/office/drawing/2014/main" id="{57C8921C-016C-4323-B3DC-2A2603C553C4}"/>
-              </a:ext>
-            </a:extLst>
-          </p:cNvPr>
-          <p:cNvSpPr txBox="1"/>
-          <p:nvPr/>
-        </p:nvSpPr>
-        <p:spPr>
-          <a:xfrm>
-            <a:off x="2787267" y="2997621"/>
-            <a:ext cx="6290200" cy="816955"/>
-          </a:xfrm>
-          <a:prstGeom prst="rect">
-            <a:avLst/>
-          </a:prstGeom>
-          <a:noFill/>
-        </p:spPr>
-        <p:txBody>
-          <a:bodyPr wrap="square" rtlCol="0">
-            <a:spAutoFit/>
-          </a:bodyPr>
-          <a:lstStyle/>
-          <a:p>
-            <a:pPr algn="ctr">
-              <a:lnSpc>
-                <a:spcPct val="200000"/>
-              </a:lnSpc>
-            </a:pPr>
-            <a:r>
-              <a:rPr lang="ko-KR" altLang="en-US" sz="2800" spc="-150" dirty="0">
-                <a:latin typeface="Malgun Gothic Semilight" panose="020B0503020000020004" pitchFamily="34" charset="-127"/>
-                <a:ea typeface="Malgun Gothic Semilight" panose="020B0503020000020004" pitchFamily="34" charset="-127"/>
-              </a:rPr>
-              <a:t>인증           입력 유효성 검사</a:t>
-            </a:r>
-            <a:endParaRPr lang="en-US" sz="2800" spc="-150" dirty="0">
-              <a:latin typeface="Malgun Gothic Semilight" panose="020B0503020000020004" pitchFamily="34" charset="-127"/>
-              <a:ea typeface="Malgun Gothic Semilight" panose="020B0503020000020004" pitchFamily="34" charset="-127"/>
-            </a:endParaRPr>
-          </a:p>
-        </p:txBody>
-      </p:sp>
-      <p:sp>
-        <p:nvSpPr>
-          <p:cNvPr id="23" name="TextBox 22">
-            <a:extLst>
-              <a:ext uri="{FF2B5EF4-FFF2-40B4-BE49-F238E27FC236}">
-                <a16:creationId xmlns:a16="http://schemas.microsoft.com/office/drawing/2014/main" id="{B67A2975-4E01-49EE-A3BB-DB05BDDC2E84}"/>
-              </a:ext>
-            </a:extLst>
-          </p:cNvPr>
-          <p:cNvSpPr txBox="1"/>
-          <p:nvPr/>
-        </p:nvSpPr>
-        <p:spPr>
-          <a:xfrm>
-            <a:off x="2777642" y="4006500"/>
-            <a:ext cx="6290200" cy="816955"/>
-          </a:xfrm>
-          <a:prstGeom prst="rect">
-            <a:avLst/>
-          </a:prstGeom>
-          <a:noFill/>
-        </p:spPr>
-        <p:txBody>
-          <a:bodyPr wrap="square" rtlCol="0">
-            <a:spAutoFit/>
-          </a:bodyPr>
-          <a:lstStyle/>
-          <a:p>
-            <a:pPr algn="ctr">
-              <a:lnSpc>
-                <a:spcPct val="200000"/>
-              </a:lnSpc>
-            </a:pPr>
-            <a:r>
-              <a:rPr lang="ko-KR" altLang="en-US" sz="2800" spc="-150" dirty="0">
-                <a:latin typeface="Malgun Gothic Semilight" panose="020B0503020000020004" pitchFamily="34" charset="-127"/>
-                <a:ea typeface="Malgun Gothic Semilight" panose="020B0503020000020004" pitchFamily="34" charset="-127"/>
-              </a:rPr>
-              <a:t>유저관리</a:t>
-            </a:r>
-            <a:r>
-              <a:rPr lang="en-US" altLang="ko-KR" sz="2800" spc="-150" dirty="0">
-                <a:latin typeface="Malgun Gothic Semilight" panose="020B0503020000020004" pitchFamily="34" charset="-127"/>
-                <a:ea typeface="Malgun Gothic Semilight" panose="020B0503020000020004" pitchFamily="34" charset="-127"/>
-              </a:rPr>
-              <a:t>	</a:t>
-            </a:r>
-            <a:r>
-              <a:rPr lang="ko-KR" altLang="en-US" sz="2800" spc="-150" dirty="0">
-                <a:latin typeface="Malgun Gothic Semilight" panose="020B0503020000020004" pitchFamily="34" charset="-127"/>
-                <a:ea typeface="Malgun Gothic Semilight" panose="020B0503020000020004" pitchFamily="34" charset="-127"/>
-              </a:rPr>
-              <a:t>예약기능     버스관리</a:t>
-            </a:r>
-            <a:endParaRPr lang="en-US" sz="2800" spc="-150" dirty="0">
-              <a:latin typeface="Malgun Gothic Semilight" panose="020B0503020000020004" pitchFamily="34" charset="-127"/>
-              <a:ea typeface="Malgun Gothic Semilight" panose="020B0503020000020004" pitchFamily="34" charset="-127"/>
-            </a:endParaRPr>
-          </a:p>
-        </p:txBody>
-      </p:sp>
-      <p:sp>
-        <p:nvSpPr>
-          <p:cNvPr id="24" name="TextBox 23">
-            <a:extLst>
-              <a:ext uri="{FF2B5EF4-FFF2-40B4-BE49-F238E27FC236}">
-                <a16:creationId xmlns:a16="http://schemas.microsoft.com/office/drawing/2014/main" id="{91EB1773-59BC-4C55-98F3-BF96557FE890}"/>
-              </a:ext>
-            </a:extLst>
-          </p:cNvPr>
-          <p:cNvSpPr txBox="1"/>
-          <p:nvPr/>
-        </p:nvSpPr>
-        <p:spPr>
-          <a:xfrm>
-            <a:off x="3656434" y="5117126"/>
-            <a:ext cx="4551865" cy="816955"/>
-          </a:xfrm>
-          <a:prstGeom prst="rect">
-            <a:avLst/>
-          </a:prstGeom>
-          <a:noFill/>
-        </p:spPr>
-        <p:txBody>
-          <a:bodyPr wrap="square" rtlCol="0">
-            <a:spAutoFit/>
-          </a:bodyPr>
-          <a:lstStyle/>
-          <a:p>
-            <a:pPr algn="ctr">
-              <a:lnSpc>
-                <a:spcPct val="200000"/>
-              </a:lnSpc>
-            </a:pPr>
-            <a:r>
-              <a:rPr lang="en-US" sz="2800" spc="-150" dirty="0">
-                <a:latin typeface="Malgun Gothic Semilight" panose="020B0503020000020004" pitchFamily="34" charset="-127"/>
-                <a:ea typeface="Malgun Gothic Semilight" panose="020B0503020000020004" pitchFamily="34" charset="-127"/>
-              </a:rPr>
-              <a:t>Database</a:t>
-            </a:r>
-            <a:r>
-              <a:rPr lang="ko-KR" altLang="en-US" sz="2800" spc="-150" dirty="0">
-                <a:latin typeface="Malgun Gothic Semilight" panose="020B0503020000020004" pitchFamily="34" charset="-127"/>
-                <a:ea typeface="Malgun Gothic Semilight" panose="020B0503020000020004" pitchFamily="34" charset="-127"/>
+              <a:t>Architectural</a:t>
+            </a:r>
+            <a:r>
+              <a:rPr lang="ko-KR" altLang="en-US" dirty="0">
+                <a:latin typeface="HY중고딕" panose="02030600000101010101" pitchFamily="18" charset="-127"/>
+                <a:ea typeface="HY중고딕" panose="02030600000101010101" pitchFamily="18" charset="-127"/>
               </a:rPr>
               <a:t> </a:t>
             </a:r>
             <a:r>
-              <a:rPr lang="en-US" altLang="ko-KR" sz="2800" spc="-150" dirty="0">
-                <a:latin typeface="Malgun Gothic Semilight" panose="020B0503020000020004" pitchFamily="34" charset="-127"/>
-                <a:ea typeface="Malgun Gothic Semilight" panose="020B0503020000020004" pitchFamily="34" charset="-127"/>
+              <a:rPr lang="en-US" altLang="ko-KR" dirty="0">
+                <a:latin typeface="HY중고딕" panose="02030600000101010101" pitchFamily="18" charset="-127"/>
+                <a:ea typeface="HY중고딕" panose="02030600000101010101" pitchFamily="18" charset="-127"/>
               </a:rPr>
-              <a:t>Management System</a:t>
-            </a:r>
-            <a:endParaRPr lang="en-US" sz="2800" spc="-150" dirty="0">
-              <a:latin typeface="Malgun Gothic Semilight" panose="020B0503020000020004" pitchFamily="34" charset="-127"/>
-              <a:ea typeface="Malgun Gothic Semilight" panose="020B0503020000020004" pitchFamily="34" charset="-127"/>
+              <a:t>Model</a:t>
+            </a:r>
+            <a:endParaRPr lang="ko-KR" altLang="en-US" dirty="0">
+              <a:latin typeface="HY중고딕" panose="02030600000101010101" pitchFamily="18" charset="-127"/>
+              <a:ea typeface="HY중고딕" panose="02030600000101010101" pitchFamily="18" charset="-127"/>
             </a:endParaRPr>
           </a:p>
         </p:txBody>
@@ -3009,7 +2772,7 @@
     </p:spTree>
     <p:extLst>
       <p:ext uri="{BB962C8B-B14F-4D97-AF65-F5344CB8AC3E}">
-        <p14:creationId xmlns:p14="http://schemas.microsoft.com/office/powerpoint/2010/main" val="1174097838"/>
+        <p14:creationId xmlns:p14="http://schemas.microsoft.com/office/powerpoint/2010/main" val="2831566107"/>
       </p:ext>
     </p:extLst>
   </p:cSld>
@@ -3038,14 +2801,14 @@
       </p:grpSpPr>
       <p:sp>
         <p:nvSpPr>
-          <p:cNvPr id="2" name="TextBox 1"/>
+          <p:cNvPr id="11" name="TextBox 10"/>
           <p:cNvSpPr txBox="1"/>
           <p:nvPr/>
         </p:nvSpPr>
         <p:spPr>
           <a:xfrm>
-            <a:off x="3925974" y="2400300"/>
-            <a:ext cx="797013" cy="769441"/>
+            <a:off x="3799480" y="1232977"/>
+            <a:ext cx="4439036" cy="707886"/>
           </a:xfrm>
           <a:prstGeom prst="rect">
             <a:avLst/>
@@ -3058,80 +2821,561 @@
           </a:bodyPr>
           <a:lstStyle/>
           <a:p>
-            <a:r>
-              <a:rPr lang="en-US" altLang="ko-KR" sz="4400" spc="-300" dirty="0">
+            <a:pPr algn="ctr"/>
+            <a:r>
+              <a:rPr lang="en-US" altLang="ko-KR" sz="4000" b="1" spc="-150" dirty="0">
+                <a:solidFill>
+                  <a:srgbClr val="8DBABD"/>
+                </a:solidFill>
+                <a:latin typeface="Malgun Gothic Semilight" panose="020B0502040204020203" pitchFamily="34" charset="-127"/>
+                <a:ea typeface="Malgun Gothic Semilight" panose="020B0502040204020203" pitchFamily="34" charset="-127"/>
+              </a:rPr>
+              <a:t>Layered Architecture</a:t>
+            </a:r>
+            <a:endParaRPr lang="ko-KR" altLang="en-US" sz="4000" b="1" spc="-150" dirty="0">
+              <a:solidFill>
+                <a:srgbClr val="8DBABD"/>
+              </a:solidFill>
+              <a:latin typeface="Malgun Gothic Semilight" panose="020B0502040204020203" pitchFamily="34" charset="-127"/>
+              <a:ea typeface="Malgun Gothic Semilight" panose="020B0502040204020203" pitchFamily="34" charset="-127"/>
+            </a:endParaRPr>
+          </a:p>
+        </p:txBody>
+      </p:sp>
+      <p:cxnSp>
+        <p:nvCxnSpPr>
+          <p:cNvPr id="14" name="직선 연결선 13"/>
+          <p:cNvCxnSpPr/>
+          <p:nvPr/>
+        </p:nvCxnSpPr>
+        <p:spPr>
+          <a:xfrm>
+            <a:off x="10430892" y="144941"/>
+            <a:ext cx="360000" cy="0"/>
+          </a:xfrm>
+          <a:prstGeom prst="line">
+            <a:avLst/>
+          </a:prstGeom>
+          <a:ln w="44450" cap="rnd">
+            <a:solidFill>
+              <a:srgbClr val="D0CECE"/>
+            </a:solidFill>
+          </a:ln>
+          <a:effectLst>
+            <a:outerShdw blurRad="50800" dist="38100" dir="5400000" algn="t" rotWithShape="0">
+              <a:prstClr val="black">
+                <a:alpha val="40000"/>
+              </a:prstClr>
+            </a:outerShdw>
+          </a:effectLst>
+        </p:spPr>
+        <p:style>
+          <a:lnRef idx="1">
+            <a:schemeClr val="accent1"/>
+          </a:lnRef>
+          <a:fillRef idx="0">
+            <a:schemeClr val="accent1"/>
+          </a:fillRef>
+          <a:effectRef idx="0">
+            <a:schemeClr val="accent1"/>
+          </a:effectRef>
+          <a:fontRef idx="minor">
+            <a:schemeClr val="tx1"/>
+          </a:fontRef>
+        </p:style>
+      </p:cxnSp>
+      <p:cxnSp>
+        <p:nvCxnSpPr>
+          <p:cNvPr id="15" name="직선 연결선 14"/>
+          <p:cNvCxnSpPr/>
+          <p:nvPr/>
+        </p:nvCxnSpPr>
+        <p:spPr>
+          <a:xfrm>
+            <a:off x="10858459" y="144941"/>
+            <a:ext cx="360000" cy="0"/>
+          </a:xfrm>
+          <a:prstGeom prst="line">
+            <a:avLst/>
+          </a:prstGeom>
+          <a:ln w="44450" cap="rnd">
+            <a:solidFill>
+              <a:schemeClr val="bg2">
+                <a:lumMod val="90000"/>
+              </a:schemeClr>
+            </a:solidFill>
+          </a:ln>
+          <a:effectLst>
+            <a:outerShdw blurRad="50800" dist="38100" dir="5400000" algn="t" rotWithShape="0">
+              <a:prstClr val="black">
+                <a:alpha val="40000"/>
+              </a:prstClr>
+            </a:outerShdw>
+          </a:effectLst>
+        </p:spPr>
+        <p:style>
+          <a:lnRef idx="1">
+            <a:schemeClr val="accent1"/>
+          </a:lnRef>
+          <a:fillRef idx="0">
+            <a:schemeClr val="accent1"/>
+          </a:fillRef>
+          <a:effectRef idx="0">
+            <a:schemeClr val="accent1"/>
+          </a:effectRef>
+          <a:fontRef idx="minor">
+            <a:schemeClr val="tx1"/>
+          </a:fontRef>
+        </p:style>
+      </p:cxnSp>
+      <p:cxnSp>
+        <p:nvCxnSpPr>
+          <p:cNvPr id="16" name="직선 연결선 15"/>
+          <p:cNvCxnSpPr/>
+          <p:nvPr/>
+        </p:nvCxnSpPr>
+        <p:spPr>
+          <a:xfrm>
+            <a:off x="11286026" y="144941"/>
+            <a:ext cx="360000" cy="0"/>
+          </a:xfrm>
+          <a:prstGeom prst="line">
+            <a:avLst/>
+          </a:prstGeom>
+          <a:ln w="44450" cap="rnd">
+            <a:solidFill>
+              <a:schemeClr val="bg2">
+                <a:lumMod val="90000"/>
+              </a:schemeClr>
+            </a:solidFill>
+          </a:ln>
+          <a:effectLst>
+            <a:outerShdw blurRad="50800" dist="38100" dir="5400000" algn="t" rotWithShape="0">
+              <a:prstClr val="black">
+                <a:alpha val="40000"/>
+              </a:prstClr>
+            </a:outerShdw>
+          </a:effectLst>
+        </p:spPr>
+        <p:style>
+          <a:lnRef idx="1">
+            <a:schemeClr val="accent1"/>
+          </a:lnRef>
+          <a:fillRef idx="0">
+            <a:schemeClr val="accent1"/>
+          </a:fillRef>
+          <a:effectRef idx="0">
+            <a:schemeClr val="accent1"/>
+          </a:effectRef>
+          <a:fontRef idx="minor">
+            <a:schemeClr val="tx1"/>
+          </a:fontRef>
+        </p:style>
+      </p:cxnSp>
+      <p:cxnSp>
+        <p:nvCxnSpPr>
+          <p:cNvPr id="17" name="직선 연결선 16"/>
+          <p:cNvCxnSpPr/>
+          <p:nvPr/>
+        </p:nvCxnSpPr>
+        <p:spPr>
+          <a:xfrm>
+            <a:off x="11713592" y="144941"/>
+            <a:ext cx="360000" cy="0"/>
+          </a:xfrm>
+          <a:prstGeom prst="line">
+            <a:avLst/>
+          </a:prstGeom>
+          <a:ln w="44450" cap="rnd">
+            <a:solidFill>
+              <a:srgbClr val="8DBABD"/>
+            </a:solidFill>
+          </a:ln>
+          <a:effectLst>
+            <a:outerShdw blurRad="50800" dist="38100" dir="5400000" algn="t" rotWithShape="0">
+              <a:prstClr val="black">
+                <a:alpha val="40000"/>
+              </a:prstClr>
+            </a:outerShdw>
+          </a:effectLst>
+        </p:spPr>
+        <p:style>
+          <a:lnRef idx="1">
+            <a:schemeClr val="accent1"/>
+          </a:lnRef>
+          <a:fillRef idx="0">
+            <a:schemeClr val="accent1"/>
+          </a:fillRef>
+          <a:effectRef idx="0">
+            <a:schemeClr val="accent1"/>
+          </a:effectRef>
+          <a:fontRef idx="minor">
+            <a:schemeClr val="tx1"/>
+          </a:fontRef>
+        </p:style>
+      </p:cxnSp>
+      <p:cxnSp>
+        <p:nvCxnSpPr>
+          <p:cNvPr id="18" name="직선 연결선 17"/>
+          <p:cNvCxnSpPr>
+            <a:cxnSpLocks/>
+          </p:cNvCxnSpPr>
+          <p:nvPr/>
+        </p:nvCxnSpPr>
+        <p:spPr>
+          <a:xfrm>
+            <a:off x="1026522" y="989148"/>
+            <a:ext cx="3258731" cy="0"/>
+          </a:xfrm>
+          <a:prstGeom prst="line">
+            <a:avLst/>
+          </a:prstGeom>
+          <a:ln>
+            <a:solidFill>
+              <a:schemeClr val="bg1">
+                <a:lumMod val="50000"/>
+              </a:schemeClr>
+            </a:solidFill>
+          </a:ln>
+        </p:spPr>
+        <p:style>
+          <a:lnRef idx="1">
+            <a:schemeClr val="accent1"/>
+          </a:lnRef>
+          <a:fillRef idx="0">
+            <a:schemeClr val="accent1"/>
+          </a:fillRef>
+          <a:effectRef idx="0">
+            <a:schemeClr val="accent1"/>
+          </a:effectRef>
+          <a:fontRef idx="minor">
+            <a:schemeClr val="tx1"/>
+          </a:fontRef>
+        </p:style>
+      </p:cxnSp>
+      <p:sp>
+        <p:nvSpPr>
+          <p:cNvPr id="19" name="TextBox 18"/>
+          <p:cNvSpPr txBox="1"/>
+          <p:nvPr/>
+        </p:nvSpPr>
+        <p:spPr>
+          <a:xfrm>
+            <a:off x="868741" y="422154"/>
+            <a:ext cx="3485634" cy="584775"/>
+          </a:xfrm>
+          <a:prstGeom prst="rect">
+            <a:avLst/>
+          </a:prstGeom>
+          <a:noFill/>
+        </p:spPr>
+        <p:txBody>
+          <a:bodyPr wrap="none" rtlCol="0">
+            <a:spAutoFit/>
+          </a:bodyPr>
+          <a:lstStyle/>
+          <a:p>
+            <a:pPr algn="ctr"/>
+            <a:r>
+              <a:rPr lang="en-US" altLang="ko-KR" sz="3200" spc="-150" dirty="0">
                 <a:solidFill>
                   <a:srgbClr val="00002F"/>
                 </a:solidFill>
-                <a:latin typeface="나눔스퀘어 Bold" panose="020B0600000101010101" pitchFamily="50" charset="-127"/>
-                <a:ea typeface="나눔스퀘어 Bold" panose="020B0600000101010101" pitchFamily="50" charset="-127"/>
+                <a:latin typeface="나눔스퀘어 ExtraBold"/>
+                <a:ea typeface="Malgun Gothic Semilight" panose="020B0502040204020203" pitchFamily="34" charset="-127"/>
               </a:rPr>
-              <a:t>06</a:t>
-            </a:r>
-            <a:endParaRPr lang="ko-KR" altLang="en-US" sz="4400" spc="-300" dirty="0">
+              <a:t>Architectural Model</a:t>
+            </a:r>
+            <a:endParaRPr lang="ko-KR" altLang="en-US" sz="3200" spc="-150" dirty="0">
               <a:solidFill>
                 <a:srgbClr val="00002F"/>
               </a:solidFill>
-              <a:latin typeface="나눔스퀘어 Bold" panose="020B0600000101010101" pitchFamily="50" charset="-127"/>
-              <a:ea typeface="나눔스퀘어 Bold" panose="020B0600000101010101" pitchFamily="50" charset="-127"/>
+              <a:latin typeface="나눔스퀘어 ExtraBold"/>
+              <a:ea typeface="Malgun Gothic Semilight" panose="020B0502040204020203" pitchFamily="34" charset="-127"/>
             </a:endParaRPr>
           </a:p>
         </p:txBody>
       </p:sp>
       <p:sp>
         <p:nvSpPr>
-          <p:cNvPr id="3" name="직사각형 2"/>
-          <p:cNvSpPr/>
+          <p:cNvPr id="20" name="TextBox 19"/>
+          <p:cNvSpPr txBox="1"/>
           <p:nvPr/>
         </p:nvSpPr>
         <p:spPr>
           <a:xfrm>
-            <a:off x="4000499" y="3169741"/>
-            <a:ext cx="4200071" cy="473345"/>
+            <a:off x="496409" y="498947"/>
+            <a:ext cx="532517" cy="461665"/>
           </a:xfrm>
           <a:prstGeom prst="rect">
             <a:avLst/>
           </a:prstGeom>
-          <a:solidFill>
-            <a:srgbClr val="8DBABD"/>
-          </a:solidFill>
-          <a:ln>
-            <a:solidFill>
-              <a:srgbClr val="8DBABD"/>
-            </a:solidFill>
-          </a:ln>
-        </p:spPr>
-        <p:style>
-          <a:lnRef idx="2">
-            <a:schemeClr val="accent1">
-              <a:shade val="50000"/>
-            </a:schemeClr>
-          </a:lnRef>
-          <a:fillRef idx="1">
-            <a:schemeClr val="accent1"/>
-          </a:fillRef>
-          <a:effectRef idx="0">
-            <a:schemeClr val="accent1"/>
-          </a:effectRef>
-          <a:fontRef idx="minor">
-            <a:schemeClr val="lt1"/>
-          </a:fontRef>
-        </p:style>
+          <a:noFill/>
+        </p:spPr>
         <p:txBody>
-          <a:bodyPr rtlCol="0" anchor="ctr"/>
+          <a:bodyPr wrap="none" rtlCol="0">
+            <a:spAutoFit/>
+          </a:bodyPr>
           <a:lstStyle/>
           <a:p>
             <a:pPr algn="ctr"/>
             <a:r>
-              <a:rPr lang="en-US" altLang="ko-KR" dirty="0">
-                <a:latin typeface="나눔스퀘어 Bold" panose="020B0600000101010101" pitchFamily="50" charset="-127"/>
-                <a:ea typeface="나눔스퀘어 Bold" panose="020B0600000101010101" pitchFamily="50" charset="-127"/>
+              <a:rPr lang="en-US" altLang="ko-KR" sz="2400" spc="-150" dirty="0">
+                <a:solidFill>
+                  <a:srgbClr val="00002F"/>
+                </a:solidFill>
+                <a:latin typeface="Malgun Gothic Semilight" panose="020B0502040204020203" pitchFamily="34" charset="-127"/>
+                <a:ea typeface="Malgun Gothic Semilight" panose="020B0502040204020203" pitchFamily="34" charset="-127"/>
               </a:rPr>
-              <a:t>Process Model</a:t>
-            </a:r>
-            <a:endParaRPr lang="ko-KR" altLang="en-US" dirty="0">
-              <a:latin typeface="나눔스퀘어 Bold" panose="020B0600000101010101" pitchFamily="50" charset="-127"/>
-              <a:ea typeface="나눔스퀘어 Bold" panose="020B0600000101010101" pitchFamily="50" charset="-127"/>
+              <a:t>05.</a:t>
+            </a:r>
+            <a:endParaRPr lang="ko-KR" altLang="en-US" sz="2400" spc="-150" dirty="0">
+              <a:solidFill>
+                <a:srgbClr val="00002F"/>
+              </a:solidFill>
+              <a:latin typeface="Malgun Gothic Semilight" panose="020B0502040204020203" pitchFamily="34" charset="-127"/>
+              <a:ea typeface="Malgun Gothic Semilight" panose="020B0502040204020203" pitchFamily="34" charset="-127"/>
+            </a:endParaRPr>
+          </a:p>
+        </p:txBody>
+      </p:sp>
+      <p:pic>
+        <p:nvPicPr>
+          <p:cNvPr id="4" name="Picture 3">
+            <a:extLst>
+              <a:ext uri="{FF2B5EF4-FFF2-40B4-BE49-F238E27FC236}">
+                <a16:creationId xmlns:a16="http://schemas.microsoft.com/office/drawing/2014/main" id="{78A9E877-2873-4F14-9587-FF3FB0EFE392}"/>
+              </a:ext>
+            </a:extLst>
+          </p:cNvPr>
+          <p:cNvPicPr>
+            <a:picLocks noChangeAspect="1"/>
+          </p:cNvPicPr>
+          <p:nvPr/>
+        </p:nvPicPr>
+        <p:blipFill rotWithShape="1">
+          <a:blip r:embed="rId2"/>
+          <a:srcRect l="2390" t="3977" r="2924" b="4358"/>
+          <a:stretch/>
+        </p:blipFill>
+        <p:spPr>
+          <a:xfrm>
+            <a:off x="2853801" y="2117555"/>
+            <a:ext cx="6290200" cy="4090737"/>
+          </a:xfrm>
+          <a:prstGeom prst="rect">
+            <a:avLst/>
+          </a:prstGeom>
+        </p:spPr>
+      </p:pic>
+      <p:sp>
+        <p:nvSpPr>
+          <p:cNvPr id="5" name="TextBox 4">
+            <a:extLst>
+              <a:ext uri="{FF2B5EF4-FFF2-40B4-BE49-F238E27FC236}">
+                <a16:creationId xmlns:a16="http://schemas.microsoft.com/office/drawing/2014/main" id="{CB3D56C9-6CCA-4F0B-A41E-CAA4A52CE0E6}"/>
+              </a:ext>
+            </a:extLst>
+          </p:cNvPr>
+          <p:cNvSpPr txBox="1"/>
+          <p:nvPr/>
+        </p:nvSpPr>
+        <p:spPr>
+          <a:xfrm>
+            <a:off x="4321584" y="1988742"/>
+            <a:ext cx="3202317" cy="816955"/>
+          </a:xfrm>
+          <a:prstGeom prst="rect">
+            <a:avLst/>
+          </a:prstGeom>
+          <a:noFill/>
+        </p:spPr>
+        <p:txBody>
+          <a:bodyPr wrap="square" rtlCol="0">
+            <a:spAutoFit/>
+          </a:bodyPr>
+          <a:lstStyle/>
+          <a:p>
+            <a:pPr algn="ctr">
+              <a:lnSpc>
+                <a:spcPct val="200000"/>
+              </a:lnSpc>
+            </a:pPr>
+            <a:r>
+              <a:rPr lang="en-US" sz="2800" spc="-150" dirty="0">
+                <a:latin typeface="Malgun Gothic Semilight" panose="020B0503020000020004" pitchFamily="34" charset="-127"/>
+                <a:ea typeface="Malgun Gothic Semilight" panose="020B0503020000020004" pitchFamily="34" charset="-127"/>
+              </a:rPr>
+              <a:t>User Interface (I/O)</a:t>
+            </a:r>
+          </a:p>
+        </p:txBody>
+      </p:sp>
+      <p:sp>
+        <p:nvSpPr>
+          <p:cNvPr id="22" name="TextBox 21">
+            <a:extLst>
+              <a:ext uri="{FF2B5EF4-FFF2-40B4-BE49-F238E27FC236}">
+                <a16:creationId xmlns:a16="http://schemas.microsoft.com/office/drawing/2014/main" id="{57C8921C-016C-4323-B3DC-2A2603C553C4}"/>
+              </a:ext>
+            </a:extLst>
+          </p:cNvPr>
+          <p:cNvSpPr txBox="1"/>
+          <p:nvPr/>
+        </p:nvSpPr>
+        <p:spPr>
+          <a:xfrm>
+            <a:off x="2787267" y="2997621"/>
+            <a:ext cx="6290200" cy="816955"/>
+          </a:xfrm>
+          <a:prstGeom prst="rect">
+            <a:avLst/>
+          </a:prstGeom>
+          <a:noFill/>
+        </p:spPr>
+        <p:txBody>
+          <a:bodyPr wrap="square" rtlCol="0">
+            <a:spAutoFit/>
+          </a:bodyPr>
+          <a:lstStyle/>
+          <a:p>
+            <a:pPr algn="ctr">
+              <a:lnSpc>
+                <a:spcPct val="200000"/>
+              </a:lnSpc>
+            </a:pPr>
+            <a:r>
+              <a:rPr lang="ko-KR" altLang="en-US" sz="2800" spc="-150" dirty="0">
+                <a:latin typeface="Malgun Gothic Semilight" panose="020B0503020000020004" pitchFamily="34" charset="-127"/>
+                <a:ea typeface="Malgun Gothic Semilight" panose="020B0503020000020004" pitchFamily="34" charset="-127"/>
+              </a:rPr>
+              <a:t>인증           입력 유효성 검사</a:t>
+            </a:r>
+            <a:endParaRPr lang="en-US" sz="2800" spc="-150" dirty="0">
+              <a:latin typeface="Malgun Gothic Semilight" panose="020B0503020000020004" pitchFamily="34" charset="-127"/>
+              <a:ea typeface="Malgun Gothic Semilight" panose="020B0503020000020004" pitchFamily="34" charset="-127"/>
+            </a:endParaRPr>
+          </a:p>
+        </p:txBody>
+      </p:sp>
+      <p:sp>
+        <p:nvSpPr>
+          <p:cNvPr id="23" name="TextBox 22">
+            <a:extLst>
+              <a:ext uri="{FF2B5EF4-FFF2-40B4-BE49-F238E27FC236}">
+                <a16:creationId xmlns:a16="http://schemas.microsoft.com/office/drawing/2014/main" id="{B67A2975-4E01-49EE-A3BB-DB05BDDC2E84}"/>
+              </a:ext>
+            </a:extLst>
+          </p:cNvPr>
+          <p:cNvSpPr txBox="1"/>
+          <p:nvPr/>
+        </p:nvSpPr>
+        <p:spPr>
+          <a:xfrm>
+            <a:off x="2777642" y="4006500"/>
+            <a:ext cx="6290200" cy="816955"/>
+          </a:xfrm>
+          <a:prstGeom prst="rect">
+            <a:avLst/>
+          </a:prstGeom>
+          <a:noFill/>
+        </p:spPr>
+        <p:txBody>
+          <a:bodyPr wrap="square" rtlCol="0">
+            <a:spAutoFit/>
+          </a:bodyPr>
+          <a:lstStyle/>
+          <a:p>
+            <a:pPr algn="ctr">
+              <a:lnSpc>
+                <a:spcPct val="200000"/>
+              </a:lnSpc>
+            </a:pPr>
+            <a:r>
+              <a:rPr lang="ko-KR" altLang="en-US" sz="2800" spc="-150" dirty="0">
+                <a:latin typeface="Malgun Gothic Semilight" panose="020B0503020000020004" pitchFamily="34" charset="-127"/>
+                <a:ea typeface="Malgun Gothic Semilight" panose="020B0503020000020004" pitchFamily="34" charset="-127"/>
+              </a:rPr>
+              <a:t>유저관리</a:t>
+            </a:r>
+            <a:r>
+              <a:rPr lang="en-US" altLang="ko-KR" sz="2800" spc="-150" dirty="0">
+                <a:latin typeface="Malgun Gothic Semilight" panose="020B0503020000020004" pitchFamily="34" charset="-127"/>
+                <a:ea typeface="Malgun Gothic Semilight" panose="020B0503020000020004" pitchFamily="34" charset="-127"/>
+              </a:rPr>
+              <a:t>	</a:t>
+            </a:r>
+            <a:r>
+              <a:rPr lang="ko-KR" altLang="en-US" sz="2800" spc="-150" dirty="0">
+                <a:latin typeface="Malgun Gothic Semilight" panose="020B0503020000020004" pitchFamily="34" charset="-127"/>
+                <a:ea typeface="Malgun Gothic Semilight" panose="020B0503020000020004" pitchFamily="34" charset="-127"/>
+              </a:rPr>
+              <a:t>예약기능     버스관리</a:t>
+            </a:r>
+            <a:endParaRPr lang="en-US" sz="2800" spc="-150" dirty="0">
+              <a:latin typeface="Malgun Gothic Semilight" panose="020B0503020000020004" pitchFamily="34" charset="-127"/>
+              <a:ea typeface="Malgun Gothic Semilight" panose="020B0503020000020004" pitchFamily="34" charset="-127"/>
+            </a:endParaRPr>
+          </a:p>
+        </p:txBody>
+      </p:sp>
+      <p:sp>
+        <p:nvSpPr>
+          <p:cNvPr id="24" name="TextBox 23">
+            <a:extLst>
+              <a:ext uri="{FF2B5EF4-FFF2-40B4-BE49-F238E27FC236}">
+                <a16:creationId xmlns:a16="http://schemas.microsoft.com/office/drawing/2014/main" id="{91EB1773-59BC-4C55-98F3-BF96557FE890}"/>
+              </a:ext>
+            </a:extLst>
+          </p:cNvPr>
+          <p:cNvSpPr txBox="1"/>
+          <p:nvPr/>
+        </p:nvSpPr>
+        <p:spPr>
+          <a:xfrm>
+            <a:off x="3656434" y="5117126"/>
+            <a:ext cx="4551865" cy="816955"/>
+          </a:xfrm>
+          <a:prstGeom prst="rect">
+            <a:avLst/>
+          </a:prstGeom>
+          <a:noFill/>
+        </p:spPr>
+        <p:txBody>
+          <a:bodyPr wrap="square" rtlCol="0">
+            <a:spAutoFit/>
+          </a:bodyPr>
+          <a:lstStyle/>
+          <a:p>
+            <a:pPr algn="ctr">
+              <a:lnSpc>
+                <a:spcPct val="200000"/>
+              </a:lnSpc>
+            </a:pPr>
+            <a:r>
+              <a:rPr lang="en-US" sz="2800" spc="-150" dirty="0">
+                <a:latin typeface="Malgun Gothic Semilight" panose="020B0503020000020004" pitchFamily="34" charset="-127"/>
+                <a:ea typeface="Malgun Gothic Semilight" panose="020B0503020000020004" pitchFamily="34" charset="-127"/>
+              </a:rPr>
+              <a:t>Database</a:t>
+            </a:r>
+            <a:r>
+              <a:rPr lang="ko-KR" altLang="en-US" sz="2800" spc="-150" dirty="0">
+                <a:latin typeface="Malgun Gothic Semilight" panose="020B0503020000020004" pitchFamily="34" charset="-127"/>
+                <a:ea typeface="Malgun Gothic Semilight" panose="020B0503020000020004" pitchFamily="34" charset="-127"/>
+              </a:rPr>
+              <a:t> </a:t>
+            </a:r>
+            <a:r>
+              <a:rPr lang="en-US" altLang="ko-KR" sz="2800" spc="-150" dirty="0">
+                <a:latin typeface="Malgun Gothic Semilight" panose="020B0503020000020004" pitchFamily="34" charset="-127"/>
+                <a:ea typeface="Malgun Gothic Semilight" panose="020B0503020000020004" pitchFamily="34" charset="-127"/>
+              </a:rPr>
+              <a:t>Management System</a:t>
+            </a:r>
+            <a:endParaRPr lang="en-US" sz="2800" spc="-150" dirty="0">
+              <a:latin typeface="Malgun Gothic Semilight" panose="020B0503020000020004" pitchFamily="34" charset="-127"/>
+              <a:ea typeface="Malgun Gothic Semilight" panose="020B0503020000020004" pitchFamily="34" charset="-127"/>
             </a:endParaRPr>
           </a:p>
         </p:txBody>
@@ -3139,7 +3383,7 @@
     </p:spTree>
     <p:extLst>
       <p:ext uri="{BB962C8B-B14F-4D97-AF65-F5344CB8AC3E}">
-        <p14:creationId xmlns:p14="http://schemas.microsoft.com/office/powerpoint/2010/main" val="1520267434"/>
+        <p14:creationId xmlns:p14="http://schemas.microsoft.com/office/powerpoint/2010/main" val="1174097838"/>
       </p:ext>
     </p:extLst>
   </p:cSld>
@@ -3166,6 +3410,136 @@
           <a:chExt cx="0" cy="0"/>
         </a:xfrm>
       </p:grpSpPr>
+      <p:sp>
+        <p:nvSpPr>
+          <p:cNvPr id="2" name="TextBox 1"/>
+          <p:cNvSpPr txBox="1"/>
+          <p:nvPr/>
+        </p:nvSpPr>
+        <p:spPr>
+          <a:xfrm>
+            <a:off x="3925974" y="2400300"/>
+            <a:ext cx="797013" cy="769441"/>
+          </a:xfrm>
+          <a:prstGeom prst="rect">
+            <a:avLst/>
+          </a:prstGeom>
+          <a:noFill/>
+        </p:spPr>
+        <p:txBody>
+          <a:bodyPr wrap="none" rtlCol="0">
+            <a:spAutoFit/>
+          </a:bodyPr>
+          <a:lstStyle/>
+          <a:p>
+            <a:r>
+              <a:rPr lang="en-US" altLang="ko-KR" sz="4400" spc="-300" dirty="0">
+                <a:solidFill>
+                  <a:srgbClr val="00002F"/>
+                </a:solidFill>
+                <a:latin typeface="나눔스퀘어 Bold" panose="020B0600000101010101" pitchFamily="50" charset="-127"/>
+                <a:ea typeface="나눔스퀘어 Bold" panose="020B0600000101010101" pitchFamily="50" charset="-127"/>
+              </a:rPr>
+              <a:t>06</a:t>
+            </a:r>
+            <a:endParaRPr lang="ko-KR" altLang="en-US" sz="4400" spc="-300" dirty="0">
+              <a:solidFill>
+                <a:srgbClr val="00002F"/>
+              </a:solidFill>
+              <a:latin typeface="나눔스퀘어 Bold" panose="020B0600000101010101" pitchFamily="50" charset="-127"/>
+              <a:ea typeface="나눔스퀘어 Bold" panose="020B0600000101010101" pitchFamily="50" charset="-127"/>
+            </a:endParaRPr>
+          </a:p>
+        </p:txBody>
+      </p:sp>
+      <p:sp>
+        <p:nvSpPr>
+          <p:cNvPr id="3" name="직사각형 2"/>
+          <p:cNvSpPr/>
+          <p:nvPr/>
+        </p:nvSpPr>
+        <p:spPr>
+          <a:xfrm>
+            <a:off x="4000499" y="3169741"/>
+            <a:ext cx="4200071" cy="473345"/>
+          </a:xfrm>
+          <a:prstGeom prst="rect">
+            <a:avLst/>
+          </a:prstGeom>
+          <a:solidFill>
+            <a:srgbClr val="8DBABD"/>
+          </a:solidFill>
+          <a:ln>
+            <a:solidFill>
+              <a:srgbClr val="8DBABD"/>
+            </a:solidFill>
+          </a:ln>
+        </p:spPr>
+        <p:style>
+          <a:lnRef idx="2">
+            <a:schemeClr val="accent1">
+              <a:shade val="50000"/>
+            </a:schemeClr>
+          </a:lnRef>
+          <a:fillRef idx="1">
+            <a:schemeClr val="accent1"/>
+          </a:fillRef>
+          <a:effectRef idx="0">
+            <a:schemeClr val="accent1"/>
+          </a:effectRef>
+          <a:fontRef idx="minor">
+            <a:schemeClr val="lt1"/>
+          </a:fontRef>
+        </p:style>
+        <p:txBody>
+          <a:bodyPr rtlCol="0" anchor="ctr"/>
+          <a:lstStyle/>
+          <a:p>
+            <a:pPr algn="ctr"/>
+            <a:r>
+              <a:rPr lang="en-US" altLang="ko-KR" dirty="0">
+                <a:latin typeface="나눔스퀘어 Bold" panose="020B0600000101010101" pitchFamily="50" charset="-127"/>
+                <a:ea typeface="나눔스퀘어 Bold" panose="020B0600000101010101" pitchFamily="50" charset="-127"/>
+              </a:rPr>
+              <a:t>Process Model</a:t>
+            </a:r>
+            <a:endParaRPr lang="ko-KR" altLang="en-US" dirty="0">
+              <a:latin typeface="나눔스퀘어 Bold" panose="020B0600000101010101" pitchFamily="50" charset="-127"/>
+              <a:ea typeface="나눔스퀘어 Bold" panose="020B0600000101010101" pitchFamily="50" charset="-127"/>
+            </a:endParaRPr>
+          </a:p>
+        </p:txBody>
+      </p:sp>
+    </p:spTree>
+    <p:extLst>
+      <p:ext uri="{BB962C8B-B14F-4D97-AF65-F5344CB8AC3E}">
+        <p14:creationId xmlns:p14="http://schemas.microsoft.com/office/powerpoint/2010/main" val="1520267434"/>
+      </p:ext>
+    </p:extLst>
+  </p:cSld>
+  <p:clrMapOvr>
+    <a:masterClrMapping/>
+  </p:clrMapOvr>
+</p:sld>
+</file>
+
+<file path=ppt/slides/slide17.xml><?xml version="1.0" encoding="utf-8"?>
+<p:sld xmlns:a="http://schemas.openxmlformats.org/drawingml/2006/main" xmlns:r="http://schemas.openxmlformats.org/officeDocument/2006/relationships" xmlns:p="http://schemas.openxmlformats.org/presentationml/2006/main">
+  <p:cSld>
+    <p:spTree>
+      <p:nvGrpSpPr>
+        <p:cNvPr id="1" name=""/>
+        <p:cNvGrpSpPr/>
+        <p:nvPr/>
+      </p:nvGrpSpPr>
+      <p:grpSpPr>
+        <a:xfrm>
+          <a:off x="0" y="0"/>
+          <a:ext cx="0" cy="0"/>
+          <a:chOff x="0" y="0"/>
+          <a:chExt cx="0" cy="0"/>
+        </a:xfrm>
+      </p:grpSpPr>
       <p:cxnSp>
         <p:nvCxnSpPr>
           <p:cNvPr id="18" name="직선 연결선 17"/>
@@ -3579,7 +3953,7 @@
 </p:sld>
 </file>
 
-<file path=ppt/slides/slide17.xml><?xml version="1.0" encoding="utf-8"?>
+<file path=ppt/slides/slide18.xml><?xml version="1.0" encoding="utf-8"?>
 <p:sld xmlns:a="http://schemas.openxmlformats.org/drawingml/2006/main" xmlns:r="http://schemas.openxmlformats.org/officeDocument/2006/relationships" xmlns:p="http://schemas.openxmlformats.org/presentationml/2006/main">
   <p:cSld>
     <p:spTree>
@@ -4165,7 +4539,7 @@
 </p:sld>
 </file>
 
-<file path=ppt/slides/slide18.xml><?xml version="1.0" encoding="utf-8"?>
+<file path=ppt/slides/slide19.xml><?xml version="1.0" encoding="utf-8"?>
 <p:sld xmlns:a="http://schemas.openxmlformats.org/drawingml/2006/main" xmlns:r="http://schemas.openxmlformats.org/officeDocument/2006/relationships" xmlns:p="http://schemas.openxmlformats.org/presentationml/2006/main">
   <p:cSld>
     <p:spTree>
@@ -4293,402 +4667,6 @@
     <p:extLst>
       <p:ext uri="{BB962C8B-B14F-4D97-AF65-F5344CB8AC3E}">
         <p14:creationId xmlns:p14="http://schemas.microsoft.com/office/powerpoint/2010/main" val="1862650958"/>
-      </p:ext>
-    </p:extLst>
-  </p:cSld>
-  <p:clrMapOvr>
-    <a:masterClrMapping/>
-  </p:clrMapOvr>
-</p:sld>
-</file>
-
-<file path=ppt/slides/slide19.xml><?xml version="1.0" encoding="utf-8"?>
-<p:sld xmlns:a="http://schemas.openxmlformats.org/drawingml/2006/main" xmlns:r="http://schemas.openxmlformats.org/officeDocument/2006/relationships" xmlns:p="http://schemas.openxmlformats.org/presentationml/2006/main">
-  <p:cSld>
-    <p:spTree>
-      <p:nvGrpSpPr>
-        <p:cNvPr id="1" name=""/>
-        <p:cNvGrpSpPr/>
-        <p:nvPr/>
-      </p:nvGrpSpPr>
-      <p:grpSpPr>
-        <a:xfrm>
-          <a:off x="0" y="0"/>
-          <a:ext cx="0" cy="0"/>
-          <a:chOff x="0" y="0"/>
-          <a:chExt cx="0" cy="0"/>
-        </a:xfrm>
-      </p:grpSpPr>
-      <p:sp>
-        <p:nvSpPr>
-          <p:cNvPr id="11" name="TextBox 10"/>
-          <p:cNvSpPr txBox="1"/>
-          <p:nvPr/>
-        </p:nvSpPr>
-        <p:spPr>
-          <a:xfrm>
-            <a:off x="3265572" y="1279239"/>
-            <a:ext cx="5314340" cy="707886"/>
-          </a:xfrm>
-          <a:prstGeom prst="rect">
-            <a:avLst/>
-          </a:prstGeom>
-          <a:noFill/>
-        </p:spPr>
-        <p:txBody>
-          <a:bodyPr wrap="none" rtlCol="0">
-            <a:spAutoFit/>
-          </a:bodyPr>
-          <a:lstStyle/>
-          <a:p>
-            <a:pPr algn="ctr"/>
-            <a:r>
-              <a:rPr lang="en-US" altLang="ko-KR" sz="4000" b="1" spc="-150" dirty="0">
-                <a:solidFill>
-                  <a:srgbClr val="8DBABD"/>
-                </a:solidFill>
-                <a:latin typeface="Malgun Gothic Semilight" panose="020B0502040204020203" pitchFamily="34" charset="-127"/>
-                <a:ea typeface="Malgun Gothic Semilight" panose="020B0502040204020203" pitchFamily="34" charset="-127"/>
-              </a:rPr>
-              <a:t>Throw-Away Prototyping</a:t>
-            </a:r>
-            <a:endParaRPr lang="ko-KR" altLang="en-US" sz="4000" b="1" spc="-150" dirty="0">
-              <a:solidFill>
-                <a:srgbClr val="8DBABD"/>
-              </a:solidFill>
-              <a:latin typeface="Malgun Gothic Semilight" panose="020B0502040204020203" pitchFamily="34" charset="-127"/>
-              <a:ea typeface="Malgun Gothic Semilight" panose="020B0502040204020203" pitchFamily="34" charset="-127"/>
-            </a:endParaRPr>
-          </a:p>
-        </p:txBody>
-      </p:sp>
-      <p:cxnSp>
-        <p:nvCxnSpPr>
-          <p:cNvPr id="14" name="직선 연결선 13"/>
-          <p:cNvCxnSpPr/>
-          <p:nvPr/>
-        </p:nvCxnSpPr>
-        <p:spPr>
-          <a:xfrm>
-            <a:off x="10430892" y="144941"/>
-            <a:ext cx="360000" cy="0"/>
-          </a:xfrm>
-          <a:prstGeom prst="line">
-            <a:avLst/>
-          </a:prstGeom>
-          <a:ln w="44450" cap="rnd">
-            <a:solidFill>
-              <a:srgbClr val="D0CECE"/>
-            </a:solidFill>
-          </a:ln>
-          <a:effectLst>
-            <a:outerShdw blurRad="50800" dist="38100" dir="5400000" algn="t" rotWithShape="0">
-              <a:prstClr val="black">
-                <a:alpha val="40000"/>
-              </a:prstClr>
-            </a:outerShdw>
-          </a:effectLst>
-        </p:spPr>
-        <p:style>
-          <a:lnRef idx="1">
-            <a:schemeClr val="accent1"/>
-          </a:lnRef>
-          <a:fillRef idx="0">
-            <a:schemeClr val="accent1"/>
-          </a:fillRef>
-          <a:effectRef idx="0">
-            <a:schemeClr val="accent1"/>
-          </a:effectRef>
-          <a:fontRef idx="minor">
-            <a:schemeClr val="tx1"/>
-          </a:fontRef>
-        </p:style>
-      </p:cxnSp>
-      <p:cxnSp>
-        <p:nvCxnSpPr>
-          <p:cNvPr id="15" name="직선 연결선 14"/>
-          <p:cNvCxnSpPr/>
-          <p:nvPr/>
-        </p:nvCxnSpPr>
-        <p:spPr>
-          <a:xfrm>
-            <a:off x="10858459" y="144941"/>
-            <a:ext cx="360000" cy="0"/>
-          </a:xfrm>
-          <a:prstGeom prst="line">
-            <a:avLst/>
-          </a:prstGeom>
-          <a:ln w="44450" cap="rnd">
-            <a:solidFill>
-              <a:schemeClr val="bg2">
-                <a:lumMod val="90000"/>
-              </a:schemeClr>
-            </a:solidFill>
-          </a:ln>
-          <a:effectLst>
-            <a:outerShdw blurRad="50800" dist="38100" dir="5400000" algn="t" rotWithShape="0">
-              <a:prstClr val="black">
-                <a:alpha val="40000"/>
-              </a:prstClr>
-            </a:outerShdw>
-          </a:effectLst>
-        </p:spPr>
-        <p:style>
-          <a:lnRef idx="1">
-            <a:schemeClr val="accent1"/>
-          </a:lnRef>
-          <a:fillRef idx="0">
-            <a:schemeClr val="accent1"/>
-          </a:fillRef>
-          <a:effectRef idx="0">
-            <a:schemeClr val="accent1"/>
-          </a:effectRef>
-          <a:fontRef idx="minor">
-            <a:schemeClr val="tx1"/>
-          </a:fontRef>
-        </p:style>
-      </p:cxnSp>
-      <p:cxnSp>
-        <p:nvCxnSpPr>
-          <p:cNvPr id="16" name="직선 연결선 15"/>
-          <p:cNvCxnSpPr/>
-          <p:nvPr/>
-        </p:nvCxnSpPr>
-        <p:spPr>
-          <a:xfrm>
-            <a:off x="11286026" y="144941"/>
-            <a:ext cx="360000" cy="0"/>
-          </a:xfrm>
-          <a:prstGeom prst="line">
-            <a:avLst/>
-          </a:prstGeom>
-          <a:ln w="44450" cap="rnd">
-            <a:solidFill>
-              <a:schemeClr val="bg2">
-                <a:lumMod val="90000"/>
-              </a:schemeClr>
-            </a:solidFill>
-          </a:ln>
-          <a:effectLst>
-            <a:outerShdw blurRad="50800" dist="38100" dir="5400000" algn="t" rotWithShape="0">
-              <a:prstClr val="black">
-                <a:alpha val="40000"/>
-              </a:prstClr>
-            </a:outerShdw>
-          </a:effectLst>
-        </p:spPr>
-        <p:style>
-          <a:lnRef idx="1">
-            <a:schemeClr val="accent1"/>
-          </a:lnRef>
-          <a:fillRef idx="0">
-            <a:schemeClr val="accent1"/>
-          </a:fillRef>
-          <a:effectRef idx="0">
-            <a:schemeClr val="accent1"/>
-          </a:effectRef>
-          <a:fontRef idx="minor">
-            <a:schemeClr val="tx1"/>
-          </a:fontRef>
-        </p:style>
-      </p:cxnSp>
-      <p:cxnSp>
-        <p:nvCxnSpPr>
-          <p:cNvPr id="17" name="직선 연결선 16"/>
-          <p:cNvCxnSpPr/>
-          <p:nvPr/>
-        </p:nvCxnSpPr>
-        <p:spPr>
-          <a:xfrm>
-            <a:off x="11713592" y="144941"/>
-            <a:ext cx="360000" cy="0"/>
-          </a:xfrm>
-          <a:prstGeom prst="line">
-            <a:avLst/>
-          </a:prstGeom>
-          <a:ln w="44450" cap="rnd">
-            <a:solidFill>
-              <a:srgbClr val="8DBABD"/>
-            </a:solidFill>
-          </a:ln>
-          <a:effectLst>
-            <a:outerShdw blurRad="50800" dist="38100" dir="5400000" algn="t" rotWithShape="0">
-              <a:prstClr val="black">
-                <a:alpha val="40000"/>
-              </a:prstClr>
-            </a:outerShdw>
-          </a:effectLst>
-        </p:spPr>
-        <p:style>
-          <a:lnRef idx="1">
-            <a:schemeClr val="accent1"/>
-          </a:lnRef>
-          <a:fillRef idx="0">
-            <a:schemeClr val="accent1"/>
-          </a:fillRef>
-          <a:effectRef idx="0">
-            <a:schemeClr val="accent1"/>
-          </a:effectRef>
-          <a:fontRef idx="minor">
-            <a:schemeClr val="tx1"/>
-          </a:fontRef>
-        </p:style>
-      </p:cxnSp>
-      <p:cxnSp>
-        <p:nvCxnSpPr>
-          <p:cNvPr id="18" name="직선 연결선 17"/>
-          <p:cNvCxnSpPr>
-            <a:cxnSpLocks/>
-          </p:cNvCxnSpPr>
-          <p:nvPr/>
-        </p:nvCxnSpPr>
-        <p:spPr>
-          <a:xfrm>
-            <a:off x="1026522" y="989148"/>
-            <a:ext cx="3462928" cy="0"/>
-          </a:xfrm>
-          <a:prstGeom prst="line">
-            <a:avLst/>
-          </a:prstGeom>
-          <a:ln>
-            <a:solidFill>
-              <a:schemeClr val="bg1">
-                <a:lumMod val="50000"/>
-              </a:schemeClr>
-            </a:solidFill>
-          </a:ln>
-        </p:spPr>
-        <p:style>
-          <a:lnRef idx="1">
-            <a:schemeClr val="accent1"/>
-          </a:lnRef>
-          <a:fillRef idx="0">
-            <a:schemeClr val="accent1"/>
-          </a:fillRef>
-          <a:effectRef idx="0">
-            <a:schemeClr val="accent1"/>
-          </a:effectRef>
-          <a:fontRef idx="minor">
-            <a:schemeClr val="tx1"/>
-          </a:fontRef>
-        </p:style>
-      </p:cxnSp>
-      <p:sp>
-        <p:nvSpPr>
-          <p:cNvPr id="19" name="TextBox 18"/>
-          <p:cNvSpPr txBox="1"/>
-          <p:nvPr/>
-        </p:nvSpPr>
-        <p:spPr>
-          <a:xfrm>
-            <a:off x="898672" y="412529"/>
-            <a:ext cx="3656770" cy="523220"/>
-          </a:xfrm>
-          <a:prstGeom prst="rect">
-            <a:avLst/>
-          </a:prstGeom>
-          <a:noFill/>
-        </p:spPr>
-        <p:txBody>
-          <a:bodyPr wrap="none" rtlCol="0">
-            <a:spAutoFit/>
-          </a:bodyPr>
-          <a:lstStyle/>
-          <a:p>
-            <a:pPr algn="ctr"/>
-            <a:r>
-              <a:rPr lang="ko-KR" altLang="en-US" sz="2800" b="1" dirty="0">
-                <a:latin typeface="HY중고딕" panose="02030600000101010101" pitchFamily="18" charset="-127"/>
-                <a:ea typeface="HY중고딕" panose="02030600000101010101" pitchFamily="18" charset="-127"/>
-              </a:rPr>
-              <a:t>수행계획 및 추진전략</a:t>
-            </a:r>
-          </a:p>
-        </p:txBody>
-      </p:sp>
-      <p:sp>
-        <p:nvSpPr>
-          <p:cNvPr id="20" name="TextBox 19"/>
-          <p:cNvSpPr txBox="1"/>
-          <p:nvPr/>
-        </p:nvSpPr>
-        <p:spPr>
-          <a:xfrm>
-            <a:off x="502820" y="498947"/>
-            <a:ext cx="519694" cy="461665"/>
-          </a:xfrm>
-          <a:prstGeom prst="rect">
-            <a:avLst/>
-          </a:prstGeom>
-          <a:noFill/>
-        </p:spPr>
-        <p:txBody>
-          <a:bodyPr wrap="none" rtlCol="0">
-            <a:spAutoFit/>
-          </a:bodyPr>
-          <a:lstStyle/>
-          <a:p>
-            <a:pPr algn="ctr"/>
-            <a:r>
-              <a:rPr lang="en-US" altLang="ko-KR" sz="2400" spc="-150" dirty="0">
-                <a:solidFill>
-                  <a:srgbClr val="00002F"/>
-                </a:solidFill>
-                <a:latin typeface="Malgun Gothic Semilight" panose="020B0502040204020203" pitchFamily="34" charset="-127"/>
-                <a:ea typeface="Malgun Gothic Semilight" panose="020B0502040204020203" pitchFamily="34" charset="-127"/>
-              </a:rPr>
-              <a:t>07.</a:t>
-            </a:r>
-            <a:endParaRPr lang="ko-KR" altLang="en-US" sz="2400" spc="-150" dirty="0">
-              <a:solidFill>
-                <a:srgbClr val="00002F"/>
-              </a:solidFill>
-              <a:latin typeface="Malgun Gothic Semilight" panose="020B0502040204020203" pitchFamily="34" charset="-127"/>
-              <a:ea typeface="Malgun Gothic Semilight" panose="020B0502040204020203" pitchFamily="34" charset="-127"/>
-            </a:endParaRPr>
-          </a:p>
-        </p:txBody>
-      </p:sp>
-      <p:pic>
-        <p:nvPicPr>
-          <p:cNvPr id="9" name="Picture 8">
-            <a:extLst>
-              <a:ext uri="{FF2B5EF4-FFF2-40B4-BE49-F238E27FC236}">
-                <a16:creationId xmlns:a16="http://schemas.microsoft.com/office/drawing/2014/main" id="{AD9F3133-01CD-4E21-89ED-A2E490987F9C}"/>
-              </a:ext>
-            </a:extLst>
-          </p:cNvPr>
-          <p:cNvPicPr>
-            <a:picLocks noChangeAspect="1"/>
-          </p:cNvPicPr>
-          <p:nvPr/>
-        </p:nvPicPr>
-        <p:blipFill>
-          <a:blip r:embed="rId2">
-            <a:extLst>
-              <a:ext uri="{28A0092B-C50C-407E-A947-70E740481C1C}">
-                <a14:useLocalDpi xmlns:a14="http://schemas.microsoft.com/office/drawing/2010/main" val="0"/>
-              </a:ext>
-            </a:extLst>
-          </a:blip>
-          <a:stretch>
-            <a:fillRect/>
-          </a:stretch>
-        </p:blipFill>
-        <p:spPr>
-          <a:xfrm>
-            <a:off x="80471" y="2319296"/>
-            <a:ext cx="12002746" cy="2772465"/>
-          </a:xfrm>
-          <a:prstGeom prst="rect">
-            <a:avLst/>
-          </a:prstGeom>
-        </p:spPr>
-      </p:pic>
-    </p:spTree>
-    <p:extLst>
-      <p:ext uri="{BB962C8B-B14F-4D97-AF65-F5344CB8AC3E}">
-        <p14:creationId xmlns:p14="http://schemas.microsoft.com/office/powerpoint/2010/main" val="1803526317"/>
       </p:ext>
     </p:extLst>
   </p:cSld>
@@ -5650,6 +5628,402 @@
         </p:nvSpPr>
         <p:spPr>
           <a:xfrm>
+            <a:off x="3265572" y="1279239"/>
+            <a:ext cx="5314340" cy="707886"/>
+          </a:xfrm>
+          <a:prstGeom prst="rect">
+            <a:avLst/>
+          </a:prstGeom>
+          <a:noFill/>
+        </p:spPr>
+        <p:txBody>
+          <a:bodyPr wrap="none" rtlCol="0">
+            <a:spAutoFit/>
+          </a:bodyPr>
+          <a:lstStyle/>
+          <a:p>
+            <a:pPr algn="ctr"/>
+            <a:r>
+              <a:rPr lang="en-US" altLang="ko-KR" sz="4000" b="1" spc="-150" dirty="0">
+                <a:solidFill>
+                  <a:srgbClr val="8DBABD"/>
+                </a:solidFill>
+                <a:latin typeface="Malgun Gothic Semilight" panose="020B0502040204020203" pitchFamily="34" charset="-127"/>
+                <a:ea typeface="Malgun Gothic Semilight" panose="020B0502040204020203" pitchFamily="34" charset="-127"/>
+              </a:rPr>
+              <a:t>Throw-Away Prototyping</a:t>
+            </a:r>
+            <a:endParaRPr lang="ko-KR" altLang="en-US" sz="4000" b="1" spc="-150" dirty="0">
+              <a:solidFill>
+                <a:srgbClr val="8DBABD"/>
+              </a:solidFill>
+              <a:latin typeface="Malgun Gothic Semilight" panose="020B0502040204020203" pitchFamily="34" charset="-127"/>
+              <a:ea typeface="Malgun Gothic Semilight" panose="020B0502040204020203" pitchFamily="34" charset="-127"/>
+            </a:endParaRPr>
+          </a:p>
+        </p:txBody>
+      </p:sp>
+      <p:cxnSp>
+        <p:nvCxnSpPr>
+          <p:cNvPr id="14" name="직선 연결선 13"/>
+          <p:cNvCxnSpPr/>
+          <p:nvPr/>
+        </p:nvCxnSpPr>
+        <p:spPr>
+          <a:xfrm>
+            <a:off x="10430892" y="144941"/>
+            <a:ext cx="360000" cy="0"/>
+          </a:xfrm>
+          <a:prstGeom prst="line">
+            <a:avLst/>
+          </a:prstGeom>
+          <a:ln w="44450" cap="rnd">
+            <a:solidFill>
+              <a:srgbClr val="D0CECE"/>
+            </a:solidFill>
+          </a:ln>
+          <a:effectLst>
+            <a:outerShdw blurRad="50800" dist="38100" dir="5400000" algn="t" rotWithShape="0">
+              <a:prstClr val="black">
+                <a:alpha val="40000"/>
+              </a:prstClr>
+            </a:outerShdw>
+          </a:effectLst>
+        </p:spPr>
+        <p:style>
+          <a:lnRef idx="1">
+            <a:schemeClr val="accent1"/>
+          </a:lnRef>
+          <a:fillRef idx="0">
+            <a:schemeClr val="accent1"/>
+          </a:fillRef>
+          <a:effectRef idx="0">
+            <a:schemeClr val="accent1"/>
+          </a:effectRef>
+          <a:fontRef idx="minor">
+            <a:schemeClr val="tx1"/>
+          </a:fontRef>
+        </p:style>
+      </p:cxnSp>
+      <p:cxnSp>
+        <p:nvCxnSpPr>
+          <p:cNvPr id="15" name="직선 연결선 14"/>
+          <p:cNvCxnSpPr/>
+          <p:nvPr/>
+        </p:nvCxnSpPr>
+        <p:spPr>
+          <a:xfrm>
+            <a:off x="10858459" y="144941"/>
+            <a:ext cx="360000" cy="0"/>
+          </a:xfrm>
+          <a:prstGeom prst="line">
+            <a:avLst/>
+          </a:prstGeom>
+          <a:ln w="44450" cap="rnd">
+            <a:solidFill>
+              <a:schemeClr val="bg2">
+                <a:lumMod val="90000"/>
+              </a:schemeClr>
+            </a:solidFill>
+          </a:ln>
+          <a:effectLst>
+            <a:outerShdw blurRad="50800" dist="38100" dir="5400000" algn="t" rotWithShape="0">
+              <a:prstClr val="black">
+                <a:alpha val="40000"/>
+              </a:prstClr>
+            </a:outerShdw>
+          </a:effectLst>
+        </p:spPr>
+        <p:style>
+          <a:lnRef idx="1">
+            <a:schemeClr val="accent1"/>
+          </a:lnRef>
+          <a:fillRef idx="0">
+            <a:schemeClr val="accent1"/>
+          </a:fillRef>
+          <a:effectRef idx="0">
+            <a:schemeClr val="accent1"/>
+          </a:effectRef>
+          <a:fontRef idx="minor">
+            <a:schemeClr val="tx1"/>
+          </a:fontRef>
+        </p:style>
+      </p:cxnSp>
+      <p:cxnSp>
+        <p:nvCxnSpPr>
+          <p:cNvPr id="16" name="직선 연결선 15"/>
+          <p:cNvCxnSpPr/>
+          <p:nvPr/>
+        </p:nvCxnSpPr>
+        <p:spPr>
+          <a:xfrm>
+            <a:off x="11286026" y="144941"/>
+            <a:ext cx="360000" cy="0"/>
+          </a:xfrm>
+          <a:prstGeom prst="line">
+            <a:avLst/>
+          </a:prstGeom>
+          <a:ln w="44450" cap="rnd">
+            <a:solidFill>
+              <a:schemeClr val="bg2">
+                <a:lumMod val="90000"/>
+              </a:schemeClr>
+            </a:solidFill>
+          </a:ln>
+          <a:effectLst>
+            <a:outerShdw blurRad="50800" dist="38100" dir="5400000" algn="t" rotWithShape="0">
+              <a:prstClr val="black">
+                <a:alpha val="40000"/>
+              </a:prstClr>
+            </a:outerShdw>
+          </a:effectLst>
+        </p:spPr>
+        <p:style>
+          <a:lnRef idx="1">
+            <a:schemeClr val="accent1"/>
+          </a:lnRef>
+          <a:fillRef idx="0">
+            <a:schemeClr val="accent1"/>
+          </a:fillRef>
+          <a:effectRef idx="0">
+            <a:schemeClr val="accent1"/>
+          </a:effectRef>
+          <a:fontRef idx="minor">
+            <a:schemeClr val="tx1"/>
+          </a:fontRef>
+        </p:style>
+      </p:cxnSp>
+      <p:cxnSp>
+        <p:nvCxnSpPr>
+          <p:cNvPr id="17" name="직선 연결선 16"/>
+          <p:cNvCxnSpPr/>
+          <p:nvPr/>
+        </p:nvCxnSpPr>
+        <p:spPr>
+          <a:xfrm>
+            <a:off x="11713592" y="144941"/>
+            <a:ext cx="360000" cy="0"/>
+          </a:xfrm>
+          <a:prstGeom prst="line">
+            <a:avLst/>
+          </a:prstGeom>
+          <a:ln w="44450" cap="rnd">
+            <a:solidFill>
+              <a:srgbClr val="8DBABD"/>
+            </a:solidFill>
+          </a:ln>
+          <a:effectLst>
+            <a:outerShdw blurRad="50800" dist="38100" dir="5400000" algn="t" rotWithShape="0">
+              <a:prstClr val="black">
+                <a:alpha val="40000"/>
+              </a:prstClr>
+            </a:outerShdw>
+          </a:effectLst>
+        </p:spPr>
+        <p:style>
+          <a:lnRef idx="1">
+            <a:schemeClr val="accent1"/>
+          </a:lnRef>
+          <a:fillRef idx="0">
+            <a:schemeClr val="accent1"/>
+          </a:fillRef>
+          <a:effectRef idx="0">
+            <a:schemeClr val="accent1"/>
+          </a:effectRef>
+          <a:fontRef idx="minor">
+            <a:schemeClr val="tx1"/>
+          </a:fontRef>
+        </p:style>
+      </p:cxnSp>
+      <p:cxnSp>
+        <p:nvCxnSpPr>
+          <p:cNvPr id="18" name="직선 연결선 17"/>
+          <p:cNvCxnSpPr>
+            <a:cxnSpLocks/>
+          </p:cNvCxnSpPr>
+          <p:nvPr/>
+        </p:nvCxnSpPr>
+        <p:spPr>
+          <a:xfrm>
+            <a:off x="1026522" y="989148"/>
+            <a:ext cx="3462928" cy="0"/>
+          </a:xfrm>
+          <a:prstGeom prst="line">
+            <a:avLst/>
+          </a:prstGeom>
+          <a:ln>
+            <a:solidFill>
+              <a:schemeClr val="bg1">
+                <a:lumMod val="50000"/>
+              </a:schemeClr>
+            </a:solidFill>
+          </a:ln>
+        </p:spPr>
+        <p:style>
+          <a:lnRef idx="1">
+            <a:schemeClr val="accent1"/>
+          </a:lnRef>
+          <a:fillRef idx="0">
+            <a:schemeClr val="accent1"/>
+          </a:fillRef>
+          <a:effectRef idx="0">
+            <a:schemeClr val="accent1"/>
+          </a:effectRef>
+          <a:fontRef idx="minor">
+            <a:schemeClr val="tx1"/>
+          </a:fontRef>
+        </p:style>
+      </p:cxnSp>
+      <p:sp>
+        <p:nvSpPr>
+          <p:cNvPr id="19" name="TextBox 18"/>
+          <p:cNvSpPr txBox="1"/>
+          <p:nvPr/>
+        </p:nvSpPr>
+        <p:spPr>
+          <a:xfrm>
+            <a:off x="898672" y="412529"/>
+            <a:ext cx="3656770" cy="523220"/>
+          </a:xfrm>
+          <a:prstGeom prst="rect">
+            <a:avLst/>
+          </a:prstGeom>
+          <a:noFill/>
+        </p:spPr>
+        <p:txBody>
+          <a:bodyPr wrap="none" rtlCol="0">
+            <a:spAutoFit/>
+          </a:bodyPr>
+          <a:lstStyle/>
+          <a:p>
+            <a:pPr algn="ctr"/>
+            <a:r>
+              <a:rPr lang="ko-KR" altLang="en-US" sz="2800" b="1" dirty="0">
+                <a:latin typeface="HY중고딕" panose="02030600000101010101" pitchFamily="18" charset="-127"/>
+                <a:ea typeface="HY중고딕" panose="02030600000101010101" pitchFamily="18" charset="-127"/>
+              </a:rPr>
+              <a:t>수행계획 및 추진전략</a:t>
+            </a:r>
+          </a:p>
+        </p:txBody>
+      </p:sp>
+      <p:sp>
+        <p:nvSpPr>
+          <p:cNvPr id="20" name="TextBox 19"/>
+          <p:cNvSpPr txBox="1"/>
+          <p:nvPr/>
+        </p:nvSpPr>
+        <p:spPr>
+          <a:xfrm>
+            <a:off x="502820" y="498947"/>
+            <a:ext cx="519694" cy="461665"/>
+          </a:xfrm>
+          <a:prstGeom prst="rect">
+            <a:avLst/>
+          </a:prstGeom>
+          <a:noFill/>
+        </p:spPr>
+        <p:txBody>
+          <a:bodyPr wrap="none" rtlCol="0">
+            <a:spAutoFit/>
+          </a:bodyPr>
+          <a:lstStyle/>
+          <a:p>
+            <a:pPr algn="ctr"/>
+            <a:r>
+              <a:rPr lang="en-US" altLang="ko-KR" sz="2400" spc="-150" dirty="0">
+                <a:solidFill>
+                  <a:srgbClr val="00002F"/>
+                </a:solidFill>
+                <a:latin typeface="Malgun Gothic Semilight" panose="020B0502040204020203" pitchFamily="34" charset="-127"/>
+                <a:ea typeface="Malgun Gothic Semilight" panose="020B0502040204020203" pitchFamily="34" charset="-127"/>
+              </a:rPr>
+              <a:t>07.</a:t>
+            </a:r>
+            <a:endParaRPr lang="ko-KR" altLang="en-US" sz="2400" spc="-150" dirty="0">
+              <a:solidFill>
+                <a:srgbClr val="00002F"/>
+              </a:solidFill>
+              <a:latin typeface="Malgun Gothic Semilight" panose="020B0502040204020203" pitchFamily="34" charset="-127"/>
+              <a:ea typeface="Malgun Gothic Semilight" panose="020B0502040204020203" pitchFamily="34" charset="-127"/>
+            </a:endParaRPr>
+          </a:p>
+        </p:txBody>
+      </p:sp>
+      <p:pic>
+        <p:nvPicPr>
+          <p:cNvPr id="9" name="Picture 8">
+            <a:extLst>
+              <a:ext uri="{FF2B5EF4-FFF2-40B4-BE49-F238E27FC236}">
+                <a16:creationId xmlns:a16="http://schemas.microsoft.com/office/drawing/2014/main" id="{AD9F3133-01CD-4E21-89ED-A2E490987F9C}"/>
+              </a:ext>
+            </a:extLst>
+          </p:cNvPr>
+          <p:cNvPicPr>
+            <a:picLocks noChangeAspect="1"/>
+          </p:cNvPicPr>
+          <p:nvPr/>
+        </p:nvPicPr>
+        <p:blipFill>
+          <a:blip r:embed="rId2">
+            <a:extLst>
+              <a:ext uri="{28A0092B-C50C-407E-A947-70E740481C1C}">
+                <a14:useLocalDpi xmlns:a14="http://schemas.microsoft.com/office/drawing/2010/main" val="0"/>
+              </a:ext>
+            </a:extLst>
+          </a:blip>
+          <a:stretch>
+            <a:fillRect/>
+          </a:stretch>
+        </p:blipFill>
+        <p:spPr>
+          <a:xfrm>
+            <a:off x="80471" y="2319296"/>
+            <a:ext cx="12002746" cy="2772465"/>
+          </a:xfrm>
+          <a:prstGeom prst="rect">
+            <a:avLst/>
+          </a:prstGeom>
+        </p:spPr>
+      </p:pic>
+    </p:spTree>
+    <p:extLst>
+      <p:ext uri="{BB962C8B-B14F-4D97-AF65-F5344CB8AC3E}">
+        <p14:creationId xmlns:p14="http://schemas.microsoft.com/office/powerpoint/2010/main" val="1803526317"/>
+      </p:ext>
+    </p:extLst>
+  </p:cSld>
+  <p:clrMapOvr>
+    <a:masterClrMapping/>
+  </p:clrMapOvr>
+</p:sld>
+</file>
+
+<file path=ppt/slides/slide21.xml><?xml version="1.0" encoding="utf-8"?>
+<p:sld xmlns:a="http://schemas.openxmlformats.org/drawingml/2006/main" xmlns:r="http://schemas.openxmlformats.org/officeDocument/2006/relationships" xmlns:p="http://schemas.openxmlformats.org/presentationml/2006/main">
+  <p:cSld>
+    <p:spTree>
+      <p:nvGrpSpPr>
+        <p:cNvPr id="1" name=""/>
+        <p:cNvGrpSpPr/>
+        <p:nvPr/>
+      </p:nvGrpSpPr>
+      <p:grpSpPr>
+        <a:xfrm>
+          <a:off x="0" y="0"/>
+          <a:ext cx="0" cy="0"/>
+          <a:chOff x="0" y="0"/>
+          <a:chExt cx="0" cy="0"/>
+        </a:xfrm>
+      </p:grpSpPr>
+      <p:sp>
+        <p:nvSpPr>
+          <p:cNvPr id="11" name="TextBox 10"/>
+          <p:cNvSpPr txBox="1"/>
+          <p:nvPr/>
+        </p:nvSpPr>
+        <p:spPr>
+          <a:xfrm>
             <a:off x="5014762" y="1386402"/>
             <a:ext cx="2159567" cy="707886"/>
           </a:xfrm>
@@ -6247,7 +6621,7 @@
 </p:sld>
 </file>
 
-<file path=ppt/slides/slide21.xml><?xml version="1.0" encoding="utf-8"?>
+<file path=ppt/slides/slide22.xml><?xml version="1.0" encoding="utf-8"?>
 <p:sld xmlns:a="http://schemas.openxmlformats.org/drawingml/2006/main" xmlns:r="http://schemas.openxmlformats.org/officeDocument/2006/relationships" xmlns:p="http://schemas.openxmlformats.org/presentationml/2006/main">
   <p:cSld>
     <p:spTree>
@@ -6320,7 +6694,7 @@
 </p:sld>
 </file>
 
-<file path=ppt/slides/slide22.xml><?xml version="1.0" encoding="utf-8"?>
+<file path=ppt/slides/slide23.xml><?xml version="1.0" encoding="utf-8"?>
 <p:sld xmlns:a="http://schemas.openxmlformats.org/drawingml/2006/main" xmlns:r="http://schemas.openxmlformats.org/officeDocument/2006/relationships" xmlns:p="http://schemas.openxmlformats.org/presentationml/2006/main">
   <p:cSld>
     <p:spTree>

</xml_diff>